<commit_message>
Update Sptrint 3 Präsentation.pptx
</commit_message>
<xml_diff>
--- a/Sprint 3/Abgabe-Dateien/Sptrint 3 Präsentation.pptx
+++ b/Sprint 3/Abgabe-Dateien/Sptrint 3 Präsentation.pptx
@@ -5,9 +5,10 @@
     <p:sldMasterId id="2147483660" r:id="rId1"/>
   </p:sldMasterIdLst>
   <p:sldIdLst>
-    <p:sldId id="256" r:id="rId2"/>
-    <p:sldId id="257" r:id="rId3"/>
-    <p:sldId id="258" r:id="rId4"/>
+    <p:sldId id="259" r:id="rId2"/>
+    <p:sldId id="256" r:id="rId3"/>
+    <p:sldId id="257" r:id="rId4"/>
+    <p:sldId id="258" r:id="rId5"/>
   </p:sldIdLst>
   <p:sldSz cx="12192000" cy="6858000"/>
   <p:notesSz cx="6858000" cy="9144000"/>
@@ -5833,6 +5834,186 @@
       </p:grpSpPr>
       <p:sp>
         <p:nvSpPr>
+          <p:cNvPr id="2" name="Titel 1"/>
+          <p:cNvSpPr>
+            <a:spLocks noGrp="1"/>
+          </p:cNvSpPr>
+          <p:nvPr>
+            <p:ph type="title"/>
+          </p:nvPr>
+        </p:nvSpPr>
+        <p:spPr>
+          <a:xfrm>
+            <a:off x="201846" y="161544"/>
+            <a:ext cx="8596668" cy="1320800"/>
+          </a:xfrm>
+        </p:spPr>
+        <p:txBody>
+          <a:bodyPr/>
+          <a:lstStyle/>
+          <a:p>
+            <a:r>
+              <a:rPr lang="de-DE" dirty="0" smtClean="0">
+                <a:solidFill>
+                  <a:schemeClr val="accent2"/>
+                </a:solidFill>
+              </a:rPr>
+              <a:t>Kommunikationskanäle</a:t>
+            </a:r>
+            <a:endParaRPr lang="de-DE" dirty="0">
+              <a:solidFill>
+                <a:schemeClr val="accent2"/>
+              </a:solidFill>
+            </a:endParaRPr>
+          </a:p>
+        </p:txBody>
+      </p:sp>
+      <p:pic>
+        <p:nvPicPr>
+          <p:cNvPr id="4" name="Picture 4">
+            <a:extLst>
+              <a:ext uri="{FF2B5EF4-FFF2-40B4-BE49-F238E27FC236}">
+                <a16:creationId xmlns:a16="http://schemas.microsoft.com/office/drawing/2014/main" id="{099D1CB7-E380-4BEA-863D-C4BC3AB8F456}"/>
+              </a:ext>
+            </a:extLst>
+          </p:cNvPr>
+          <p:cNvPicPr>
+            <a:picLocks noChangeAspect="1" noChangeArrowheads="1"/>
+          </p:cNvPicPr>
+          <p:nvPr/>
+        </p:nvPicPr>
+        <p:blipFill>
+          <a:blip r:embed="rId2" cstate="hqprint">
+            <a:extLst>
+              <a:ext uri="{28A0092B-C50C-407E-A947-70E740481C1C}">
+                <a14:useLocalDpi xmlns:a14="http://schemas.microsoft.com/office/drawing/2010/main" val="0"/>
+              </a:ext>
+            </a:extLst>
+          </a:blip>
+          <a:srcRect/>
+          <a:stretch>
+            <a:fillRect/>
+          </a:stretch>
+        </p:blipFill>
+        <p:spPr bwMode="auto">
+          <a:xfrm>
+            <a:off x="563688" y="4038992"/>
+            <a:ext cx="1010055" cy="1013339"/>
+          </a:xfrm>
+          <a:prstGeom prst="rect">
+            <a:avLst/>
+          </a:prstGeom>
+          <a:noFill/>
+          <a:extLst>
+            <a:ext uri="{909E8E84-426E-40DD-AFC4-6F175D3DCCD1}">
+              <a14:hiddenFill xmlns:a14="http://schemas.microsoft.com/office/drawing/2010/main">
+                <a:solidFill>
+                  <a:srgbClr val="FFFFFF"/>
+                </a:solidFill>
+              </a14:hiddenFill>
+            </a:ext>
+          </a:extLst>
+        </p:spPr>
+      </p:pic>
+      <p:pic>
+        <p:nvPicPr>
+          <p:cNvPr id="6" name="Grafik 5"/>
+          <p:cNvPicPr>
+            <a:picLocks noChangeAspect="1"/>
+          </p:cNvPicPr>
+          <p:nvPr/>
+        </p:nvPicPr>
+        <p:blipFill>
+          <a:blip r:embed="rId3">
+            <a:extLst>
+              <a:ext uri="{28A0092B-C50C-407E-A947-70E740481C1C}">
+                <a14:useLocalDpi xmlns:a14="http://schemas.microsoft.com/office/drawing/2010/main" val="0"/>
+              </a:ext>
+            </a:extLst>
+          </a:blip>
+          <a:stretch>
+            <a:fillRect/>
+          </a:stretch>
+        </p:blipFill>
+        <p:spPr>
+          <a:xfrm>
+            <a:off x="9840" y="1040701"/>
+            <a:ext cx="4198368" cy="1556195"/>
+          </a:xfrm>
+          <a:prstGeom prst="rect">
+            <a:avLst/>
+          </a:prstGeom>
+        </p:spPr>
+      </p:pic>
+      <p:pic>
+        <p:nvPicPr>
+          <p:cNvPr id="7" name="Grafik 6"/>
+          <p:cNvPicPr>
+            <a:picLocks noChangeAspect="1"/>
+          </p:cNvPicPr>
+          <p:nvPr/>
+        </p:nvPicPr>
+        <p:blipFill>
+          <a:blip r:embed="rId4" cstate="print">
+            <a:extLst>
+              <a:ext uri="{28A0092B-C50C-407E-A947-70E740481C1C}">
+                <a14:useLocalDpi xmlns:a14="http://schemas.microsoft.com/office/drawing/2010/main" val="0"/>
+              </a:ext>
+            </a:extLst>
+          </a:blip>
+          <a:stretch>
+            <a:fillRect/>
+          </a:stretch>
+        </p:blipFill>
+        <p:spPr>
+          <a:xfrm>
+            <a:off x="9840" y="1584917"/>
+            <a:ext cx="5055108" cy="3370072"/>
+          </a:xfrm>
+          <a:prstGeom prst="rect">
+            <a:avLst/>
+          </a:prstGeom>
+        </p:spPr>
+      </p:pic>
+    </p:spTree>
+    <p:extLst>
+      <p:ext uri="{BB962C8B-B14F-4D97-AF65-F5344CB8AC3E}">
+        <p14:creationId xmlns:p14="http://schemas.microsoft.com/office/powerpoint/2010/main" val="226354326"/>
+      </p:ext>
+    </p:extLst>
+  </p:cSld>
+  <p:clrMapOvr>
+    <a:masterClrMapping/>
+  </p:clrMapOvr>
+  <p:timing>
+    <p:tnLst>
+      <p:par>
+        <p:cTn id="1" dur="indefinite" restart="never" nodeType="tmRoot"/>
+      </p:par>
+    </p:tnLst>
+  </p:timing>
+</p:sld>
+</file>
+
+<file path=ppt/slides/slide2.xml><?xml version="1.0" encoding="utf-8"?>
+<p:sld xmlns:a="http://schemas.openxmlformats.org/drawingml/2006/main" xmlns:r="http://schemas.openxmlformats.org/officeDocument/2006/relationships" xmlns:p="http://schemas.openxmlformats.org/presentationml/2006/main">
+  <p:cSld>
+    <p:spTree>
+      <p:nvGrpSpPr>
+        <p:cNvPr id="1" name=""/>
+        <p:cNvGrpSpPr/>
+        <p:nvPr/>
+      </p:nvGrpSpPr>
+      <p:grpSpPr>
+        <a:xfrm>
+          <a:off x="0" y="0"/>
+          <a:ext cx="0" cy="0"/>
+          <a:chOff x="0" y="0"/>
+          <a:chExt cx="0" cy="0"/>
+        </a:xfrm>
+      </p:grpSpPr>
+      <p:sp>
+        <p:nvSpPr>
           <p:cNvPr id="3" name="Untertitel 2">
             <a:extLst>
               <a:ext uri="{FF2B5EF4-FFF2-40B4-BE49-F238E27FC236}">
@@ -5849,8 +6030,8 @@
         </p:nvSpPr>
         <p:spPr>
           <a:xfrm>
-            <a:off x="1524000" y="668383"/>
-            <a:ext cx="9144000" cy="5521234"/>
+            <a:off x="758218" y="961790"/>
+            <a:ext cx="3863229" cy="3292537"/>
           </a:xfrm>
         </p:spPr>
         <p:txBody>
@@ -5859,62 +6040,94 @@
           <a:p>
             <a:pPr algn="l"/>
             <a:r>
-              <a:rPr lang="de-DE" sz="3600" dirty="0"/>
-              <a:t>Ziele</a:t>
+              <a:rPr lang="de-DE" u="sng" dirty="0" smtClean="0">
+                <a:solidFill>
+                  <a:schemeClr val="tx1">
+                    <a:lumMod val="65000"/>
+                    <a:lumOff val="35000"/>
+                  </a:schemeClr>
+                </a:solidFill>
+              </a:rPr>
+              <a:t>Eingabe:</a:t>
             </a:r>
           </a:p>
           <a:p>
-            <a:pPr algn="l"/>
-            <a:endParaRPr lang="de-DE" dirty="0"/>
-          </a:p>
-          <a:p>
-            <a:pPr algn="l"/>
+            <a:pPr marL="285750" indent="-285750" algn="l">
+              <a:buFont typeface="Arial" panose="020B0604020202020204" pitchFamily="34" charset="0"/>
+              <a:buChar char="•"/>
+            </a:pPr>
             <a:r>
-              <a:rPr lang="de-DE" dirty="0"/>
-              <a:t>Gewindelänge auswählbar				</a:t>
+              <a:rPr lang="de-DE" sz="1600" dirty="0" smtClean="0"/>
+              <a:t>Versch. Schraubenarten</a:t>
             </a:r>
           </a:p>
           <a:p>
-            <a:pPr algn="l"/>
+            <a:pPr marL="285750" indent="-285750" algn="l">
+              <a:buFont typeface="Arial" panose="020B0604020202020204" pitchFamily="34" charset="0"/>
+              <a:buChar char="•"/>
+            </a:pPr>
             <a:r>
-              <a:rPr lang="de-DE" dirty="0"/>
-              <a:t>Schaftlängen hinzufügen</a:t>
+              <a:rPr lang="de-DE" sz="1600" dirty="0" smtClean="0"/>
+              <a:t>Versch. Gewindedurchmesser</a:t>
             </a:r>
-          </a:p>
-          <a:p>
-            <a:pPr algn="l"/>
+            <a:endParaRPr lang="de-DE" sz="1600" dirty="0"/>
+          </a:p>
+          <a:p>
+            <a:pPr marL="285750" indent="-285750" algn="l">
+              <a:buFont typeface="Arial" panose="020B0604020202020204" pitchFamily="34" charset="0"/>
+              <a:buChar char="•"/>
+            </a:pPr>
             <a:r>
-              <a:rPr lang="de-DE" dirty="0"/>
-              <a:t>Catia Modell erstellen</a:t>
-            </a:r>
-          </a:p>
-          <a:p>
-            <a:pPr algn="l"/>
-            <a:r>
-              <a:rPr lang="de-DE" dirty="0"/>
-              <a:t>Catia &amp; </a:t>
+              <a:rPr lang="de-DE" sz="1600" dirty="0" smtClean="0"/>
+              <a:t>Versch. Gewindelängen</a:t>
             </a:r>
             <a:r>
-              <a:rPr lang="de-DE" dirty="0" err="1"/>
-              <a:t>Exel</a:t>
+              <a:rPr lang="de-DE" sz="1600" dirty="0"/>
+              <a:t>	</a:t>
+            </a:r>
+          </a:p>
+          <a:p>
+            <a:pPr marL="285750" indent="-285750" algn="l">
+              <a:buFont typeface="Arial" panose="020B0604020202020204" pitchFamily="34" charset="0"/>
+              <a:buChar char="•"/>
+            </a:pPr>
+            <a:r>
+              <a:rPr lang="de-DE" sz="1600" dirty="0" smtClean="0"/>
+              <a:t>Versch. Schaftlängen</a:t>
+            </a:r>
+          </a:p>
+          <a:p>
+            <a:pPr marL="285750" indent="-285750" algn="l">
+              <a:buFont typeface="Arial" panose="020B0604020202020204" pitchFamily="34" charset="0"/>
+              <a:buChar char="•"/>
+            </a:pPr>
+            <a:r>
+              <a:rPr lang="de-DE" sz="1600" dirty="0" smtClean="0"/>
+              <a:t>Versch. Stückzahlen</a:t>
+            </a:r>
+          </a:p>
+          <a:p>
+            <a:pPr marL="285750" indent="-285750" algn="l">
+              <a:buFont typeface="Arial" panose="020B0604020202020204" pitchFamily="34" charset="0"/>
+              <a:buChar char="•"/>
+            </a:pPr>
+            <a:r>
+              <a:rPr lang="de-DE" sz="1600" dirty="0" smtClean="0"/>
+              <a:t>Versch. Festigkeitsklassen</a:t>
+            </a:r>
+          </a:p>
+          <a:p>
+            <a:pPr marL="285750" indent="-285750" algn="l">
+              <a:buFont typeface="Arial" panose="020B0604020202020204" pitchFamily="34" charset="0"/>
+              <a:buChar char="•"/>
+            </a:pPr>
+            <a:r>
+              <a:rPr lang="de-DE" sz="1600" dirty="0" smtClean="0"/>
+              <a:t>Unterschiedliche </a:t>
             </a:r>
             <a:r>
-              <a:rPr lang="de-DE" dirty="0"/>
-              <a:t> Anbindung </a:t>
-            </a:r>
-          </a:p>
-          <a:p>
-            <a:pPr algn="l"/>
-            <a:r>
-              <a:rPr lang="de-DE" dirty="0"/>
-              <a:t>Preise erzeugen</a:t>
-            </a:r>
-          </a:p>
-          <a:p>
-            <a:pPr algn="l"/>
-            <a:r>
-              <a:rPr lang="de-DE" dirty="0"/>
-              <a:t>Unterschiedliche Materialien</a:t>
+              <a:rPr lang="de-DE" sz="1600" dirty="0"/>
+              <a:t>Materialien</a:t>
             </a:r>
           </a:p>
           <a:p>
@@ -5971,113 +6184,1424 @@
           </a:p>
         </p:txBody>
       </p:sp>
-      <p:pic>
-        <p:nvPicPr>
-          <p:cNvPr id="5" name="Grafik 4">
+      <p:sp>
+        <p:nvSpPr>
+          <p:cNvPr id="7" name="L-Form 6"/>
+          <p:cNvSpPr/>
+          <p:nvPr/>
+        </p:nvSpPr>
+        <p:spPr>
+          <a:xfrm rot="18846658">
+            <a:off x="4140746" y="1323865"/>
+            <a:ext cx="371123" cy="198452"/>
+          </a:xfrm>
+          <a:prstGeom prst="corner">
+            <a:avLst/>
+          </a:prstGeom>
+        </p:spPr>
+        <p:style>
+          <a:lnRef idx="2">
+            <a:schemeClr val="accent1">
+              <a:shade val="50000"/>
+            </a:schemeClr>
+          </a:lnRef>
+          <a:fillRef idx="1">
+            <a:schemeClr val="accent1"/>
+          </a:fillRef>
+          <a:effectRef idx="0">
+            <a:schemeClr val="accent1"/>
+          </a:effectRef>
+          <a:fontRef idx="minor">
+            <a:schemeClr val="lt1"/>
+          </a:fontRef>
+        </p:style>
+        <p:txBody>
+          <a:bodyPr rtlCol="0" anchor="ctr"/>
+          <a:lstStyle/>
+          <a:p>
+            <a:pPr algn="ctr"/>
+            <a:endParaRPr lang="de-DE"/>
+          </a:p>
+        </p:txBody>
+      </p:sp>
+      <p:sp>
+        <p:nvSpPr>
+          <p:cNvPr id="8" name="Verbotsymbol 7"/>
+          <p:cNvSpPr/>
+          <p:nvPr/>
+        </p:nvSpPr>
+        <p:spPr>
+          <a:xfrm>
+            <a:off x="4091678" y="3588926"/>
+            <a:ext cx="356175" cy="360688"/>
+          </a:xfrm>
+          <a:prstGeom prst="noSmoking">
+            <a:avLst/>
+          </a:prstGeom>
+          <a:solidFill>
+            <a:schemeClr val="accent5">
+              <a:alpha val="50000"/>
+            </a:schemeClr>
+          </a:solidFill>
+          <a:ln>
+            <a:noFill/>
+          </a:ln>
+        </p:spPr>
+        <p:style>
+          <a:lnRef idx="0">
+            <a:scrgbClr r="0" g="0" b="0"/>
+          </a:lnRef>
+          <a:fillRef idx="0">
+            <a:scrgbClr r="0" g="0" b="0"/>
+          </a:fillRef>
+          <a:effectRef idx="0">
+            <a:scrgbClr r="0" g="0" b="0"/>
+          </a:effectRef>
+          <a:fontRef idx="minor">
+            <a:schemeClr val="lt1"/>
+          </a:fontRef>
+        </p:style>
+        <p:txBody>
+          <a:bodyPr rtlCol="0" anchor="ctr"/>
+          <a:lstStyle/>
+          <a:p>
+            <a:pPr algn="ctr"/>
+            <a:endParaRPr lang="de-DE">
+              <a:solidFill>
+                <a:schemeClr val="tx1"/>
+              </a:solidFill>
+            </a:endParaRPr>
+          </a:p>
+        </p:txBody>
+      </p:sp>
+      <p:sp>
+        <p:nvSpPr>
+          <p:cNvPr id="14" name="Textfeld 13"/>
+          <p:cNvSpPr txBox="1"/>
+          <p:nvPr/>
+        </p:nvSpPr>
+        <p:spPr>
+          <a:xfrm>
+            <a:off x="871022" y="33750"/>
+            <a:ext cx="4487362" cy="646331"/>
+          </a:xfrm>
+          <a:prstGeom prst="rect">
+            <a:avLst/>
+          </a:prstGeom>
+          <a:noFill/>
+        </p:spPr>
+        <p:txBody>
+          <a:bodyPr wrap="square" rtlCol="0">
+            <a:spAutoFit/>
+          </a:bodyPr>
+          <a:lstStyle/>
+          <a:p>
+            <a:r>
+              <a:rPr lang="de-DE" sz="3600" dirty="0" smtClean="0">
+                <a:solidFill>
+                  <a:schemeClr val="accent2"/>
+                </a:solidFill>
+              </a:rPr>
+              <a:t>Ziele im Programm</a:t>
+            </a:r>
+            <a:endParaRPr lang="de-DE" sz="3600" dirty="0">
+              <a:solidFill>
+                <a:schemeClr val="accent2"/>
+              </a:solidFill>
+            </a:endParaRPr>
+          </a:p>
+        </p:txBody>
+      </p:sp>
+      <p:sp>
+        <p:nvSpPr>
+          <p:cNvPr id="17" name="Untertitel 2">
             <a:extLst>
               <a:ext uri="{FF2B5EF4-FFF2-40B4-BE49-F238E27FC236}">
-                <a16:creationId xmlns:a16="http://schemas.microsoft.com/office/drawing/2014/main" id="{09B98391-3D4A-49CE-950C-B624C40A50D9}"/>
+                <a16:creationId xmlns:a16="http://schemas.microsoft.com/office/drawing/2014/main" id="{A1E2309B-BC7E-4F14-B20E-E7EFC42C7967}"/>
               </a:ext>
             </a:extLst>
           </p:cNvPr>
-          <p:cNvPicPr>
-            <a:picLocks noChangeAspect="1"/>
-          </p:cNvPicPr>
+          <p:cNvSpPr txBox="1">
+            <a:spLocks/>
+          </p:cNvSpPr>
           <p:nvPr/>
-        </p:nvPicPr>
-        <p:blipFill>
-          <a:blip r:embed="rId2"/>
-          <a:stretch>
-            <a:fillRect/>
-          </a:stretch>
-        </p:blipFill>
+        </p:nvSpPr>
         <p:spPr>
           <a:xfrm>
-            <a:off x="896194" y="5216117"/>
-            <a:ext cx="1885663" cy="942832"/>
+            <a:off x="4832780" y="961790"/>
+            <a:ext cx="3863229" cy="3495775"/>
           </a:xfrm>
           <a:prstGeom prst="rect">
             <a:avLst/>
           </a:prstGeom>
         </p:spPr>
-      </p:pic>
-      <p:pic>
-        <p:nvPicPr>
-          <p:cNvPr id="6" name="Grafik 5">
+        <p:txBody>
+          <a:bodyPr vert="horz" lIns="91440" tIns="45720" rIns="91440" bIns="45720" rtlCol="0" anchor="t">
+            <a:normAutofit lnSpcReduction="10000"/>
+          </a:bodyPr>
+          <a:lstStyle>
+            <a:lvl1pPr marL="0" indent="0" algn="r" defTabSz="457200" rtl="0" eaLnBrk="1" latinLnBrk="0" hangingPunct="1">
+              <a:spcBef>
+                <a:spcPts val="1000"/>
+              </a:spcBef>
+              <a:spcAft>
+                <a:spcPts val="0"/>
+              </a:spcAft>
+              <a:buClr>
+                <a:schemeClr val="accent1"/>
+              </a:buClr>
+              <a:buSzPct val="80000"/>
+              <a:buFont typeface="Wingdings 3" charset="2"/>
+              <a:buNone/>
+              <a:defRPr sz="1800" kern="1200">
+                <a:solidFill>
+                  <a:schemeClr val="tx1">
+                    <a:lumMod val="50000"/>
+                    <a:lumOff val="50000"/>
+                  </a:schemeClr>
+                </a:solidFill>
+                <a:latin typeface="+mn-lt"/>
+                <a:ea typeface="+mn-ea"/>
+                <a:cs typeface="+mn-cs"/>
+              </a:defRPr>
+            </a:lvl1pPr>
+            <a:lvl2pPr marL="457200" indent="0" algn="ctr" defTabSz="457200" rtl="0" eaLnBrk="1" latinLnBrk="0" hangingPunct="1">
+              <a:spcBef>
+                <a:spcPts val="1000"/>
+              </a:spcBef>
+              <a:spcAft>
+                <a:spcPts val="0"/>
+              </a:spcAft>
+              <a:buClr>
+                <a:schemeClr val="accent1"/>
+              </a:buClr>
+              <a:buSzPct val="80000"/>
+              <a:buFont typeface="Wingdings 3" charset="2"/>
+              <a:buNone/>
+              <a:defRPr sz="1600" kern="1200">
+                <a:solidFill>
+                  <a:schemeClr val="tx1">
+                    <a:tint val="75000"/>
+                  </a:schemeClr>
+                </a:solidFill>
+                <a:latin typeface="+mn-lt"/>
+                <a:ea typeface="+mn-ea"/>
+                <a:cs typeface="+mn-cs"/>
+              </a:defRPr>
+            </a:lvl2pPr>
+            <a:lvl3pPr marL="914400" indent="0" algn="ctr" defTabSz="457200" rtl="0" eaLnBrk="1" latinLnBrk="0" hangingPunct="1">
+              <a:spcBef>
+                <a:spcPts val="1000"/>
+              </a:spcBef>
+              <a:spcAft>
+                <a:spcPts val="0"/>
+              </a:spcAft>
+              <a:buClr>
+                <a:schemeClr val="accent1"/>
+              </a:buClr>
+              <a:buSzPct val="80000"/>
+              <a:buFont typeface="Wingdings 3" charset="2"/>
+              <a:buNone/>
+              <a:defRPr sz="1400" kern="1200">
+                <a:solidFill>
+                  <a:schemeClr val="tx1">
+                    <a:tint val="75000"/>
+                  </a:schemeClr>
+                </a:solidFill>
+                <a:latin typeface="+mn-lt"/>
+                <a:ea typeface="+mn-ea"/>
+                <a:cs typeface="+mn-cs"/>
+              </a:defRPr>
+            </a:lvl3pPr>
+            <a:lvl4pPr marL="1371600" indent="0" algn="ctr" defTabSz="457200" rtl="0" eaLnBrk="1" latinLnBrk="0" hangingPunct="1">
+              <a:spcBef>
+                <a:spcPts val="1000"/>
+              </a:spcBef>
+              <a:spcAft>
+                <a:spcPts val="0"/>
+              </a:spcAft>
+              <a:buClr>
+                <a:schemeClr val="accent1"/>
+              </a:buClr>
+              <a:buSzPct val="80000"/>
+              <a:buFont typeface="Wingdings 3" charset="2"/>
+              <a:buNone/>
+              <a:defRPr sz="1200" kern="1200">
+                <a:solidFill>
+                  <a:schemeClr val="tx1">
+                    <a:tint val="75000"/>
+                  </a:schemeClr>
+                </a:solidFill>
+                <a:latin typeface="+mn-lt"/>
+                <a:ea typeface="+mn-ea"/>
+                <a:cs typeface="+mn-cs"/>
+              </a:defRPr>
+            </a:lvl4pPr>
+            <a:lvl5pPr marL="1828800" indent="0" algn="ctr" defTabSz="457200" rtl="0" eaLnBrk="1" latinLnBrk="0" hangingPunct="1">
+              <a:spcBef>
+                <a:spcPts val="1000"/>
+              </a:spcBef>
+              <a:spcAft>
+                <a:spcPts val="0"/>
+              </a:spcAft>
+              <a:buClr>
+                <a:schemeClr val="accent1"/>
+              </a:buClr>
+              <a:buSzPct val="80000"/>
+              <a:buFont typeface="Wingdings 3" charset="2"/>
+              <a:buNone/>
+              <a:defRPr sz="1200" kern="1200">
+                <a:solidFill>
+                  <a:schemeClr val="tx1">
+                    <a:tint val="75000"/>
+                  </a:schemeClr>
+                </a:solidFill>
+                <a:latin typeface="+mn-lt"/>
+                <a:ea typeface="+mn-ea"/>
+                <a:cs typeface="+mn-cs"/>
+              </a:defRPr>
+            </a:lvl5pPr>
+            <a:lvl6pPr marL="2286000" indent="0" algn="ctr" defTabSz="457200" rtl="0" eaLnBrk="1" latinLnBrk="0" hangingPunct="1">
+              <a:spcBef>
+                <a:spcPts val="1000"/>
+              </a:spcBef>
+              <a:spcAft>
+                <a:spcPts val="0"/>
+              </a:spcAft>
+              <a:buClr>
+                <a:schemeClr val="accent1"/>
+              </a:buClr>
+              <a:buSzPct val="80000"/>
+              <a:buFont typeface="Wingdings 3" charset="2"/>
+              <a:buNone/>
+              <a:defRPr sz="1200" kern="1200">
+                <a:solidFill>
+                  <a:schemeClr val="tx1">
+                    <a:tint val="75000"/>
+                  </a:schemeClr>
+                </a:solidFill>
+                <a:latin typeface="+mn-lt"/>
+                <a:ea typeface="+mn-ea"/>
+                <a:cs typeface="+mn-cs"/>
+              </a:defRPr>
+            </a:lvl6pPr>
+            <a:lvl7pPr marL="2743200" indent="0" algn="ctr" defTabSz="457200" rtl="0" eaLnBrk="1" latinLnBrk="0" hangingPunct="1">
+              <a:spcBef>
+                <a:spcPts val="1000"/>
+              </a:spcBef>
+              <a:spcAft>
+                <a:spcPts val="0"/>
+              </a:spcAft>
+              <a:buClr>
+                <a:schemeClr val="accent1"/>
+              </a:buClr>
+              <a:buSzPct val="80000"/>
+              <a:buFont typeface="Wingdings 3" charset="2"/>
+              <a:buNone/>
+              <a:defRPr sz="1200" kern="1200">
+                <a:solidFill>
+                  <a:schemeClr val="tx1">
+                    <a:tint val="75000"/>
+                  </a:schemeClr>
+                </a:solidFill>
+                <a:latin typeface="+mn-lt"/>
+                <a:ea typeface="+mn-ea"/>
+                <a:cs typeface="+mn-cs"/>
+              </a:defRPr>
+            </a:lvl7pPr>
+            <a:lvl8pPr marL="3200400" indent="0" algn="ctr" defTabSz="457200" rtl="0" eaLnBrk="1" latinLnBrk="0" hangingPunct="1">
+              <a:spcBef>
+                <a:spcPts val="1000"/>
+              </a:spcBef>
+              <a:spcAft>
+                <a:spcPts val="0"/>
+              </a:spcAft>
+              <a:buClr>
+                <a:schemeClr val="accent1"/>
+              </a:buClr>
+              <a:buSzPct val="80000"/>
+              <a:buFont typeface="Wingdings 3" charset="2"/>
+              <a:buNone/>
+              <a:defRPr sz="1200" kern="1200">
+                <a:solidFill>
+                  <a:schemeClr val="tx1">
+                    <a:tint val="75000"/>
+                  </a:schemeClr>
+                </a:solidFill>
+                <a:latin typeface="+mn-lt"/>
+                <a:ea typeface="+mn-ea"/>
+                <a:cs typeface="+mn-cs"/>
+              </a:defRPr>
+            </a:lvl8pPr>
+            <a:lvl9pPr marL="3657600" indent="0" algn="ctr" defTabSz="457200" rtl="0" eaLnBrk="1" latinLnBrk="0" hangingPunct="1">
+              <a:spcBef>
+                <a:spcPts val="1000"/>
+              </a:spcBef>
+              <a:spcAft>
+                <a:spcPts val="0"/>
+              </a:spcAft>
+              <a:buClr>
+                <a:schemeClr val="accent1"/>
+              </a:buClr>
+              <a:buSzPct val="80000"/>
+              <a:buFont typeface="Wingdings 3" charset="2"/>
+              <a:buNone/>
+              <a:defRPr sz="1200" kern="1200">
+                <a:solidFill>
+                  <a:schemeClr val="tx1">
+                    <a:tint val="75000"/>
+                  </a:schemeClr>
+                </a:solidFill>
+                <a:latin typeface="+mn-lt"/>
+                <a:ea typeface="+mn-ea"/>
+                <a:cs typeface="+mn-cs"/>
+              </a:defRPr>
+            </a:lvl9pPr>
+          </a:lstStyle>
+          <a:p>
+            <a:pPr algn="l"/>
+            <a:r>
+              <a:rPr lang="de-DE" u="sng" dirty="0" smtClean="0">
+                <a:solidFill>
+                  <a:schemeClr val="tx1">
+                    <a:lumMod val="65000"/>
+                    <a:lumOff val="35000"/>
+                  </a:schemeClr>
+                </a:solidFill>
+              </a:rPr>
+              <a:t>Ausgabe:</a:t>
+            </a:r>
+            <a:endParaRPr lang="de-DE" dirty="0" smtClean="0">
+              <a:solidFill>
+                <a:schemeClr val="tx1">
+                  <a:lumMod val="65000"/>
+                  <a:lumOff val="35000"/>
+                </a:schemeClr>
+              </a:solidFill>
+            </a:endParaRPr>
+          </a:p>
+          <a:p>
+            <a:pPr marL="285750" indent="-285750" algn="l">
+              <a:buFont typeface="Arial" panose="020B0604020202020204" pitchFamily="34" charset="0"/>
+              <a:buChar char="•"/>
+            </a:pPr>
+            <a:r>
+              <a:rPr lang="de-DE" sz="1600" dirty="0" smtClean="0"/>
+              <a:t>Schraubenwerte aus der Eingabe</a:t>
+            </a:r>
+          </a:p>
+          <a:p>
+            <a:pPr marL="285750" indent="-285750" algn="l">
+              <a:buFont typeface="Arial" panose="020B0604020202020204" pitchFamily="34" charset="0"/>
+              <a:buChar char="•"/>
+            </a:pPr>
+            <a:r>
+              <a:rPr lang="de-DE" sz="1600" dirty="0" smtClean="0"/>
+              <a:t>Schraubenkopfwerte</a:t>
+            </a:r>
+          </a:p>
+          <a:p>
+            <a:pPr marL="285750" indent="-285750" algn="l">
+              <a:buFont typeface="Arial" panose="020B0604020202020204" pitchFamily="34" charset="0"/>
+              <a:buChar char="•"/>
+            </a:pPr>
+            <a:r>
+              <a:rPr lang="de-DE" sz="1600" dirty="0" smtClean="0"/>
+              <a:t>Zugfestigkeit &amp; Streckgrenze</a:t>
+            </a:r>
+          </a:p>
+          <a:p>
+            <a:pPr marL="285750" indent="-285750" algn="l">
+              <a:buFont typeface="Arial" panose="020B0604020202020204" pitchFamily="34" charset="0"/>
+              <a:buChar char="•"/>
+            </a:pPr>
+            <a:r>
+              <a:rPr lang="de-DE" sz="1600" dirty="0" smtClean="0"/>
+              <a:t>Materialausgabe &amp; Dichte</a:t>
+            </a:r>
+          </a:p>
+          <a:p>
+            <a:pPr marL="285750" indent="-285750" algn="l">
+              <a:buFont typeface="Arial" panose="020B0604020202020204" pitchFamily="34" charset="0"/>
+              <a:buChar char="•"/>
+            </a:pPr>
+            <a:r>
+              <a:rPr lang="de-DE" sz="1600" dirty="0" smtClean="0"/>
+              <a:t>Flächenträgheitsmoment</a:t>
+            </a:r>
+          </a:p>
+          <a:p>
+            <a:pPr marL="285750" indent="-285750" algn="l">
+              <a:buFont typeface="Arial" panose="020B0604020202020204" pitchFamily="34" charset="0"/>
+              <a:buChar char="•"/>
+            </a:pPr>
+            <a:r>
+              <a:rPr lang="de-DE" sz="1600" dirty="0" smtClean="0"/>
+              <a:t>Volumen</a:t>
+            </a:r>
+          </a:p>
+          <a:p>
+            <a:pPr marL="285750" indent="-285750" algn="l">
+              <a:buFont typeface="Arial" panose="020B0604020202020204" pitchFamily="34" charset="0"/>
+              <a:buChar char="•"/>
+            </a:pPr>
+            <a:r>
+              <a:rPr lang="de-DE" sz="1600" dirty="0" smtClean="0"/>
+              <a:t>Gewicht eines Paketes</a:t>
+            </a:r>
+          </a:p>
+          <a:p>
+            <a:pPr marL="285750" indent="-285750" algn="l">
+              <a:buFont typeface="Arial" panose="020B0604020202020204" pitchFamily="34" charset="0"/>
+              <a:buChar char="•"/>
+            </a:pPr>
+            <a:r>
+              <a:rPr lang="de-DE" sz="1600" dirty="0" smtClean="0"/>
+              <a:t>Preis</a:t>
+            </a:r>
+          </a:p>
+          <a:p>
+            <a:pPr marL="285750" indent="-285750" algn="l">
+              <a:buFont typeface="Arial" panose="020B0604020202020204" pitchFamily="34" charset="0"/>
+              <a:buChar char="•"/>
+            </a:pPr>
+            <a:r>
+              <a:rPr lang="de-DE" sz="1600" dirty="0" smtClean="0"/>
+              <a:t>Simples 3D Modell der Schraube</a:t>
+            </a:r>
+          </a:p>
+        </p:txBody>
+      </p:sp>
+      <p:sp>
+        <p:nvSpPr>
+          <p:cNvPr id="19" name="Untertitel 2">
             <a:extLst>
               <a:ext uri="{FF2B5EF4-FFF2-40B4-BE49-F238E27FC236}">
-                <a16:creationId xmlns:a16="http://schemas.microsoft.com/office/drawing/2014/main" id="{82682965-DE1B-48F8-9014-2A80DF992121}"/>
+                <a16:creationId xmlns:a16="http://schemas.microsoft.com/office/drawing/2014/main" id="{A1E2309B-BC7E-4F14-B20E-E7EFC42C7967}"/>
               </a:ext>
             </a:extLst>
           </p:cNvPr>
-          <p:cNvPicPr>
-            <a:picLocks noChangeAspect="1"/>
-          </p:cNvPicPr>
+          <p:cNvSpPr txBox="1">
+            <a:spLocks/>
+          </p:cNvSpPr>
           <p:nvPr/>
-        </p:nvPicPr>
-        <p:blipFill>
-          <a:blip r:embed="rId3"/>
-          <a:stretch>
-            <a:fillRect/>
-          </a:stretch>
-        </p:blipFill>
+        </p:nvSpPr>
         <p:spPr>
           <a:xfrm>
-            <a:off x="2479376" y="5077472"/>
-            <a:ext cx="2169111" cy="1220125"/>
+            <a:off x="821366" y="4668954"/>
+            <a:ext cx="3863229" cy="4096122"/>
           </a:xfrm>
           <a:prstGeom prst="rect">
             <a:avLst/>
           </a:prstGeom>
         </p:spPr>
-      </p:pic>
-      <p:pic>
-        <p:nvPicPr>
-          <p:cNvPr id="1028" name="Picture 4">
-            <a:extLst>
-              <a:ext uri="{FF2B5EF4-FFF2-40B4-BE49-F238E27FC236}">
-                <a16:creationId xmlns:a16="http://schemas.microsoft.com/office/drawing/2014/main" id="{099D1CB7-E380-4BEA-863D-C4BC3AB8F456}"/>
-              </a:ext>
-            </a:extLst>
-          </p:cNvPr>
-          <p:cNvPicPr>
-            <a:picLocks noChangeAspect="1" noChangeArrowheads="1"/>
-          </p:cNvPicPr>
+        <p:txBody>
+          <a:bodyPr vert="horz" lIns="91440" tIns="45720" rIns="91440" bIns="45720" rtlCol="0" anchor="t">
+            <a:normAutofit/>
+          </a:bodyPr>
+          <a:lstStyle>
+            <a:lvl1pPr marL="0" indent="0" algn="r" defTabSz="457200" rtl="0" eaLnBrk="1" latinLnBrk="0" hangingPunct="1">
+              <a:spcBef>
+                <a:spcPts val="1000"/>
+              </a:spcBef>
+              <a:spcAft>
+                <a:spcPts val="0"/>
+              </a:spcAft>
+              <a:buClr>
+                <a:schemeClr val="accent1"/>
+              </a:buClr>
+              <a:buSzPct val="80000"/>
+              <a:buFont typeface="Wingdings 3" charset="2"/>
+              <a:buNone/>
+              <a:defRPr sz="1800" kern="1200">
+                <a:solidFill>
+                  <a:schemeClr val="tx1">
+                    <a:lumMod val="50000"/>
+                    <a:lumOff val="50000"/>
+                  </a:schemeClr>
+                </a:solidFill>
+                <a:latin typeface="+mn-lt"/>
+                <a:ea typeface="+mn-ea"/>
+                <a:cs typeface="+mn-cs"/>
+              </a:defRPr>
+            </a:lvl1pPr>
+            <a:lvl2pPr marL="457200" indent="0" algn="ctr" defTabSz="457200" rtl="0" eaLnBrk="1" latinLnBrk="0" hangingPunct="1">
+              <a:spcBef>
+                <a:spcPts val="1000"/>
+              </a:spcBef>
+              <a:spcAft>
+                <a:spcPts val="0"/>
+              </a:spcAft>
+              <a:buClr>
+                <a:schemeClr val="accent1"/>
+              </a:buClr>
+              <a:buSzPct val="80000"/>
+              <a:buFont typeface="Wingdings 3" charset="2"/>
+              <a:buNone/>
+              <a:defRPr sz="1600" kern="1200">
+                <a:solidFill>
+                  <a:schemeClr val="tx1">
+                    <a:tint val="75000"/>
+                  </a:schemeClr>
+                </a:solidFill>
+                <a:latin typeface="+mn-lt"/>
+                <a:ea typeface="+mn-ea"/>
+                <a:cs typeface="+mn-cs"/>
+              </a:defRPr>
+            </a:lvl2pPr>
+            <a:lvl3pPr marL="914400" indent="0" algn="ctr" defTabSz="457200" rtl="0" eaLnBrk="1" latinLnBrk="0" hangingPunct="1">
+              <a:spcBef>
+                <a:spcPts val="1000"/>
+              </a:spcBef>
+              <a:spcAft>
+                <a:spcPts val="0"/>
+              </a:spcAft>
+              <a:buClr>
+                <a:schemeClr val="accent1"/>
+              </a:buClr>
+              <a:buSzPct val="80000"/>
+              <a:buFont typeface="Wingdings 3" charset="2"/>
+              <a:buNone/>
+              <a:defRPr sz="1400" kern="1200">
+                <a:solidFill>
+                  <a:schemeClr val="tx1">
+                    <a:tint val="75000"/>
+                  </a:schemeClr>
+                </a:solidFill>
+                <a:latin typeface="+mn-lt"/>
+                <a:ea typeface="+mn-ea"/>
+                <a:cs typeface="+mn-cs"/>
+              </a:defRPr>
+            </a:lvl3pPr>
+            <a:lvl4pPr marL="1371600" indent="0" algn="ctr" defTabSz="457200" rtl="0" eaLnBrk="1" latinLnBrk="0" hangingPunct="1">
+              <a:spcBef>
+                <a:spcPts val="1000"/>
+              </a:spcBef>
+              <a:spcAft>
+                <a:spcPts val="0"/>
+              </a:spcAft>
+              <a:buClr>
+                <a:schemeClr val="accent1"/>
+              </a:buClr>
+              <a:buSzPct val="80000"/>
+              <a:buFont typeface="Wingdings 3" charset="2"/>
+              <a:buNone/>
+              <a:defRPr sz="1200" kern="1200">
+                <a:solidFill>
+                  <a:schemeClr val="tx1">
+                    <a:tint val="75000"/>
+                  </a:schemeClr>
+                </a:solidFill>
+                <a:latin typeface="+mn-lt"/>
+                <a:ea typeface="+mn-ea"/>
+                <a:cs typeface="+mn-cs"/>
+              </a:defRPr>
+            </a:lvl4pPr>
+            <a:lvl5pPr marL="1828800" indent="0" algn="ctr" defTabSz="457200" rtl="0" eaLnBrk="1" latinLnBrk="0" hangingPunct="1">
+              <a:spcBef>
+                <a:spcPts val="1000"/>
+              </a:spcBef>
+              <a:spcAft>
+                <a:spcPts val="0"/>
+              </a:spcAft>
+              <a:buClr>
+                <a:schemeClr val="accent1"/>
+              </a:buClr>
+              <a:buSzPct val="80000"/>
+              <a:buFont typeface="Wingdings 3" charset="2"/>
+              <a:buNone/>
+              <a:defRPr sz="1200" kern="1200">
+                <a:solidFill>
+                  <a:schemeClr val="tx1">
+                    <a:tint val="75000"/>
+                  </a:schemeClr>
+                </a:solidFill>
+                <a:latin typeface="+mn-lt"/>
+                <a:ea typeface="+mn-ea"/>
+                <a:cs typeface="+mn-cs"/>
+              </a:defRPr>
+            </a:lvl5pPr>
+            <a:lvl6pPr marL="2286000" indent="0" algn="ctr" defTabSz="457200" rtl="0" eaLnBrk="1" latinLnBrk="0" hangingPunct="1">
+              <a:spcBef>
+                <a:spcPts val="1000"/>
+              </a:spcBef>
+              <a:spcAft>
+                <a:spcPts val="0"/>
+              </a:spcAft>
+              <a:buClr>
+                <a:schemeClr val="accent1"/>
+              </a:buClr>
+              <a:buSzPct val="80000"/>
+              <a:buFont typeface="Wingdings 3" charset="2"/>
+              <a:buNone/>
+              <a:defRPr sz="1200" kern="1200">
+                <a:solidFill>
+                  <a:schemeClr val="tx1">
+                    <a:tint val="75000"/>
+                  </a:schemeClr>
+                </a:solidFill>
+                <a:latin typeface="+mn-lt"/>
+                <a:ea typeface="+mn-ea"/>
+                <a:cs typeface="+mn-cs"/>
+              </a:defRPr>
+            </a:lvl6pPr>
+            <a:lvl7pPr marL="2743200" indent="0" algn="ctr" defTabSz="457200" rtl="0" eaLnBrk="1" latinLnBrk="0" hangingPunct="1">
+              <a:spcBef>
+                <a:spcPts val="1000"/>
+              </a:spcBef>
+              <a:spcAft>
+                <a:spcPts val="0"/>
+              </a:spcAft>
+              <a:buClr>
+                <a:schemeClr val="accent1"/>
+              </a:buClr>
+              <a:buSzPct val="80000"/>
+              <a:buFont typeface="Wingdings 3" charset="2"/>
+              <a:buNone/>
+              <a:defRPr sz="1200" kern="1200">
+                <a:solidFill>
+                  <a:schemeClr val="tx1">
+                    <a:tint val="75000"/>
+                  </a:schemeClr>
+                </a:solidFill>
+                <a:latin typeface="+mn-lt"/>
+                <a:ea typeface="+mn-ea"/>
+                <a:cs typeface="+mn-cs"/>
+              </a:defRPr>
+            </a:lvl7pPr>
+            <a:lvl8pPr marL="3200400" indent="0" algn="ctr" defTabSz="457200" rtl="0" eaLnBrk="1" latinLnBrk="0" hangingPunct="1">
+              <a:spcBef>
+                <a:spcPts val="1000"/>
+              </a:spcBef>
+              <a:spcAft>
+                <a:spcPts val="0"/>
+              </a:spcAft>
+              <a:buClr>
+                <a:schemeClr val="accent1"/>
+              </a:buClr>
+              <a:buSzPct val="80000"/>
+              <a:buFont typeface="Wingdings 3" charset="2"/>
+              <a:buNone/>
+              <a:defRPr sz="1200" kern="1200">
+                <a:solidFill>
+                  <a:schemeClr val="tx1">
+                    <a:tint val="75000"/>
+                  </a:schemeClr>
+                </a:solidFill>
+                <a:latin typeface="+mn-lt"/>
+                <a:ea typeface="+mn-ea"/>
+                <a:cs typeface="+mn-cs"/>
+              </a:defRPr>
+            </a:lvl8pPr>
+            <a:lvl9pPr marL="3657600" indent="0" algn="ctr" defTabSz="457200" rtl="0" eaLnBrk="1" latinLnBrk="0" hangingPunct="1">
+              <a:spcBef>
+                <a:spcPts val="1000"/>
+              </a:spcBef>
+              <a:spcAft>
+                <a:spcPts val="0"/>
+              </a:spcAft>
+              <a:buClr>
+                <a:schemeClr val="accent1"/>
+              </a:buClr>
+              <a:buSzPct val="80000"/>
+              <a:buFont typeface="Wingdings 3" charset="2"/>
+              <a:buNone/>
+              <a:defRPr sz="1200" kern="1200">
+                <a:solidFill>
+                  <a:schemeClr val="tx1">
+                    <a:tint val="75000"/>
+                  </a:schemeClr>
+                </a:solidFill>
+                <a:latin typeface="+mn-lt"/>
+                <a:ea typeface="+mn-ea"/>
+                <a:cs typeface="+mn-cs"/>
+              </a:defRPr>
+            </a:lvl9pPr>
+          </a:lstStyle>
+          <a:p>
+            <a:pPr algn="l"/>
+            <a:r>
+              <a:rPr lang="de-DE" u="sng" dirty="0" smtClean="0">
+                <a:solidFill>
+                  <a:schemeClr val="tx1">
+                    <a:lumMod val="65000"/>
+                    <a:lumOff val="35000"/>
+                  </a:schemeClr>
+                </a:solidFill>
+              </a:rPr>
+              <a:t>Anbindung:</a:t>
+            </a:r>
+            <a:endParaRPr lang="de-DE" dirty="0" smtClean="0">
+              <a:solidFill>
+                <a:schemeClr val="tx1">
+                  <a:lumMod val="65000"/>
+                  <a:lumOff val="35000"/>
+                </a:schemeClr>
+              </a:solidFill>
+            </a:endParaRPr>
+          </a:p>
+          <a:p>
+            <a:pPr marL="285750" indent="-285750" algn="l">
+              <a:buFont typeface="Arial" panose="020B0604020202020204" pitchFamily="34" charset="0"/>
+              <a:buChar char="•"/>
+            </a:pPr>
+            <a:r>
+              <a:rPr lang="de-DE" dirty="0" smtClean="0"/>
+              <a:t>Excel </a:t>
+            </a:r>
+          </a:p>
+          <a:p>
+            <a:pPr marL="285750" indent="-285750" algn="l">
+              <a:buFont typeface="Arial" panose="020B0604020202020204" pitchFamily="34" charset="0"/>
+              <a:buChar char="•"/>
+            </a:pPr>
+            <a:r>
+              <a:rPr lang="de-DE" dirty="0" smtClean="0"/>
+              <a:t>Catia</a:t>
+            </a:r>
+          </a:p>
+        </p:txBody>
+      </p:sp>
+      <p:sp>
+        <p:nvSpPr>
+          <p:cNvPr id="20" name="L-Form 19"/>
+          <p:cNvSpPr/>
           <p:nvPr/>
-        </p:nvPicPr>
-        <p:blipFill>
-          <a:blip r:embed="rId4">
-            <a:extLst>
-              <a:ext uri="{28A0092B-C50C-407E-A947-70E740481C1C}">
-                <a14:useLocalDpi xmlns:a14="http://schemas.microsoft.com/office/drawing/2010/main" val="0"/>
-              </a:ext>
-            </a:extLst>
-          </a:blip>
-          <a:srcRect/>
-          <a:stretch>
-            <a:fillRect/>
-          </a:stretch>
-        </p:blipFill>
-        <p:spPr bwMode="auto">
-          <a:xfrm>
-            <a:off x="4629257" y="5104465"/>
-            <a:ext cx="1162356" cy="1166135"/>
+        </p:nvSpPr>
+        <p:spPr>
+          <a:xfrm rot="18846658">
+            <a:off x="4140746" y="1719798"/>
+            <a:ext cx="371123" cy="198452"/>
           </a:xfrm>
-          <a:prstGeom prst="rect">
+          <a:prstGeom prst="corner">
             <a:avLst/>
           </a:prstGeom>
-          <a:noFill/>
-          <a:extLst>
-            <a:ext uri="{909E8E84-426E-40DD-AFC4-6F175D3DCCD1}">
-              <a14:hiddenFill xmlns:a14="http://schemas.microsoft.com/office/drawing/2010/main">
-                <a:solidFill>
-                  <a:srgbClr val="FFFFFF"/>
-                </a:solidFill>
-              </a14:hiddenFill>
-            </a:ext>
-          </a:extLst>
         </p:spPr>
-      </p:pic>
+        <p:style>
+          <a:lnRef idx="2">
+            <a:schemeClr val="accent1">
+              <a:shade val="50000"/>
+            </a:schemeClr>
+          </a:lnRef>
+          <a:fillRef idx="1">
+            <a:schemeClr val="accent1"/>
+          </a:fillRef>
+          <a:effectRef idx="0">
+            <a:schemeClr val="accent1"/>
+          </a:effectRef>
+          <a:fontRef idx="minor">
+            <a:schemeClr val="lt1"/>
+          </a:fontRef>
+        </p:style>
+        <p:txBody>
+          <a:bodyPr rtlCol="0" anchor="ctr"/>
+          <a:lstStyle/>
+          <a:p>
+            <a:pPr algn="ctr"/>
+            <a:endParaRPr lang="de-DE"/>
+          </a:p>
+        </p:txBody>
+      </p:sp>
+      <p:sp>
+        <p:nvSpPr>
+          <p:cNvPr id="21" name="L-Form 20"/>
+          <p:cNvSpPr/>
+          <p:nvPr/>
+        </p:nvSpPr>
+        <p:spPr>
+          <a:xfrm rot="18846658">
+            <a:off x="4113857" y="2098930"/>
+            <a:ext cx="371123" cy="198452"/>
+          </a:xfrm>
+          <a:prstGeom prst="corner">
+            <a:avLst/>
+          </a:prstGeom>
+        </p:spPr>
+        <p:style>
+          <a:lnRef idx="2">
+            <a:schemeClr val="accent1">
+              <a:shade val="50000"/>
+            </a:schemeClr>
+          </a:lnRef>
+          <a:fillRef idx="1">
+            <a:schemeClr val="accent1"/>
+          </a:fillRef>
+          <a:effectRef idx="0">
+            <a:schemeClr val="accent1"/>
+          </a:effectRef>
+          <a:fontRef idx="minor">
+            <a:schemeClr val="lt1"/>
+          </a:fontRef>
+        </p:style>
+        <p:txBody>
+          <a:bodyPr rtlCol="0" anchor="ctr"/>
+          <a:lstStyle/>
+          <a:p>
+            <a:pPr algn="ctr"/>
+            <a:endParaRPr lang="de-DE"/>
+          </a:p>
+        </p:txBody>
+      </p:sp>
+      <p:sp>
+        <p:nvSpPr>
+          <p:cNvPr id="22" name="L-Form 21"/>
+          <p:cNvSpPr/>
+          <p:nvPr/>
+        </p:nvSpPr>
+        <p:spPr>
+          <a:xfrm rot="18846658">
+            <a:off x="4114542" y="2452133"/>
+            <a:ext cx="371123" cy="198452"/>
+          </a:xfrm>
+          <a:prstGeom prst="corner">
+            <a:avLst/>
+          </a:prstGeom>
+        </p:spPr>
+        <p:style>
+          <a:lnRef idx="2">
+            <a:schemeClr val="accent1">
+              <a:shade val="50000"/>
+            </a:schemeClr>
+          </a:lnRef>
+          <a:fillRef idx="1">
+            <a:schemeClr val="accent1"/>
+          </a:fillRef>
+          <a:effectRef idx="0">
+            <a:schemeClr val="accent1"/>
+          </a:effectRef>
+          <a:fontRef idx="minor">
+            <a:schemeClr val="lt1"/>
+          </a:fontRef>
+        </p:style>
+        <p:txBody>
+          <a:bodyPr rtlCol="0" anchor="ctr"/>
+          <a:lstStyle/>
+          <a:p>
+            <a:pPr algn="ctr"/>
+            <a:endParaRPr lang="de-DE"/>
+          </a:p>
+        </p:txBody>
+      </p:sp>
+      <p:sp>
+        <p:nvSpPr>
+          <p:cNvPr id="23" name="L-Form 22"/>
+          <p:cNvSpPr/>
+          <p:nvPr/>
+        </p:nvSpPr>
+        <p:spPr>
+          <a:xfrm rot="18846658">
+            <a:off x="4106521" y="2840648"/>
+            <a:ext cx="371123" cy="198452"/>
+          </a:xfrm>
+          <a:prstGeom prst="corner">
+            <a:avLst/>
+          </a:prstGeom>
+        </p:spPr>
+        <p:style>
+          <a:lnRef idx="2">
+            <a:schemeClr val="accent1">
+              <a:shade val="50000"/>
+            </a:schemeClr>
+          </a:lnRef>
+          <a:fillRef idx="1">
+            <a:schemeClr val="accent1"/>
+          </a:fillRef>
+          <a:effectRef idx="0">
+            <a:schemeClr val="accent1"/>
+          </a:effectRef>
+          <a:fontRef idx="minor">
+            <a:schemeClr val="lt1"/>
+          </a:fontRef>
+        </p:style>
+        <p:txBody>
+          <a:bodyPr rtlCol="0" anchor="ctr"/>
+          <a:lstStyle/>
+          <a:p>
+            <a:pPr algn="ctr"/>
+            <a:endParaRPr lang="de-DE"/>
+          </a:p>
+        </p:txBody>
+      </p:sp>
+      <p:sp>
+        <p:nvSpPr>
+          <p:cNvPr id="24" name="L-Form 23"/>
+          <p:cNvSpPr/>
+          <p:nvPr/>
+        </p:nvSpPr>
+        <p:spPr>
+          <a:xfrm rot="18846658">
+            <a:off x="4106521" y="3226011"/>
+            <a:ext cx="371123" cy="198452"/>
+          </a:xfrm>
+          <a:prstGeom prst="corner">
+            <a:avLst/>
+          </a:prstGeom>
+        </p:spPr>
+        <p:style>
+          <a:lnRef idx="2">
+            <a:schemeClr val="accent1">
+              <a:shade val="50000"/>
+            </a:schemeClr>
+          </a:lnRef>
+          <a:fillRef idx="1">
+            <a:schemeClr val="accent1"/>
+          </a:fillRef>
+          <a:effectRef idx="0">
+            <a:schemeClr val="accent1"/>
+          </a:effectRef>
+          <a:fontRef idx="minor">
+            <a:schemeClr val="lt1"/>
+          </a:fontRef>
+        </p:style>
+        <p:txBody>
+          <a:bodyPr rtlCol="0" anchor="ctr"/>
+          <a:lstStyle/>
+          <a:p>
+            <a:pPr algn="ctr"/>
+            <a:endParaRPr lang="de-DE"/>
+          </a:p>
+        </p:txBody>
+      </p:sp>
+      <p:sp>
+        <p:nvSpPr>
+          <p:cNvPr id="25" name="L-Form 24"/>
+          <p:cNvSpPr/>
+          <p:nvPr/>
+        </p:nvSpPr>
+        <p:spPr>
+          <a:xfrm rot="18846658">
+            <a:off x="8399925" y="1331007"/>
+            <a:ext cx="371123" cy="198452"/>
+          </a:xfrm>
+          <a:prstGeom prst="corner">
+            <a:avLst/>
+          </a:prstGeom>
+        </p:spPr>
+        <p:style>
+          <a:lnRef idx="2">
+            <a:schemeClr val="accent1">
+              <a:shade val="50000"/>
+            </a:schemeClr>
+          </a:lnRef>
+          <a:fillRef idx="1">
+            <a:schemeClr val="accent1"/>
+          </a:fillRef>
+          <a:effectRef idx="0">
+            <a:schemeClr val="accent1"/>
+          </a:effectRef>
+          <a:fontRef idx="minor">
+            <a:schemeClr val="lt1"/>
+          </a:fontRef>
+        </p:style>
+        <p:txBody>
+          <a:bodyPr rtlCol="0" anchor="ctr"/>
+          <a:lstStyle/>
+          <a:p>
+            <a:pPr algn="ctr"/>
+            <a:endParaRPr lang="de-DE"/>
+          </a:p>
+        </p:txBody>
+      </p:sp>
+      <p:sp>
+        <p:nvSpPr>
+          <p:cNvPr id="26" name="L-Form 25"/>
+          <p:cNvSpPr/>
+          <p:nvPr/>
+        </p:nvSpPr>
+        <p:spPr>
+          <a:xfrm rot="18846658">
+            <a:off x="8399924" y="1694333"/>
+            <a:ext cx="371123" cy="198452"/>
+          </a:xfrm>
+          <a:prstGeom prst="corner">
+            <a:avLst/>
+          </a:prstGeom>
+        </p:spPr>
+        <p:style>
+          <a:lnRef idx="2">
+            <a:schemeClr val="accent1">
+              <a:shade val="50000"/>
+            </a:schemeClr>
+          </a:lnRef>
+          <a:fillRef idx="1">
+            <a:schemeClr val="accent1"/>
+          </a:fillRef>
+          <a:effectRef idx="0">
+            <a:schemeClr val="accent1"/>
+          </a:effectRef>
+          <a:fontRef idx="minor">
+            <a:schemeClr val="lt1"/>
+          </a:fontRef>
+        </p:style>
+        <p:txBody>
+          <a:bodyPr rtlCol="0" anchor="ctr"/>
+          <a:lstStyle/>
+          <a:p>
+            <a:pPr algn="ctr"/>
+            <a:endParaRPr lang="de-DE"/>
+          </a:p>
+        </p:txBody>
+      </p:sp>
+      <p:sp>
+        <p:nvSpPr>
+          <p:cNvPr id="27" name="L-Form 26"/>
+          <p:cNvSpPr/>
+          <p:nvPr/>
+        </p:nvSpPr>
+        <p:spPr>
+          <a:xfrm rot="18846658">
+            <a:off x="8399922" y="2021752"/>
+            <a:ext cx="371123" cy="198452"/>
+          </a:xfrm>
+          <a:prstGeom prst="corner">
+            <a:avLst/>
+          </a:prstGeom>
+        </p:spPr>
+        <p:style>
+          <a:lnRef idx="2">
+            <a:schemeClr val="accent1">
+              <a:shade val="50000"/>
+            </a:schemeClr>
+          </a:lnRef>
+          <a:fillRef idx="1">
+            <a:schemeClr val="accent1"/>
+          </a:fillRef>
+          <a:effectRef idx="0">
+            <a:schemeClr val="accent1"/>
+          </a:effectRef>
+          <a:fontRef idx="minor">
+            <a:schemeClr val="lt1"/>
+          </a:fontRef>
+        </p:style>
+        <p:txBody>
+          <a:bodyPr rtlCol="0" anchor="ctr"/>
+          <a:lstStyle/>
+          <a:p>
+            <a:pPr algn="ctr"/>
+            <a:endParaRPr lang="de-DE"/>
+          </a:p>
+        </p:txBody>
+      </p:sp>
+      <p:sp>
+        <p:nvSpPr>
+          <p:cNvPr id="28" name="L-Form 27"/>
+          <p:cNvSpPr/>
+          <p:nvPr/>
+        </p:nvSpPr>
+        <p:spPr>
+          <a:xfrm rot="18846658">
+            <a:off x="8399923" y="2349972"/>
+            <a:ext cx="371123" cy="198452"/>
+          </a:xfrm>
+          <a:prstGeom prst="corner">
+            <a:avLst/>
+          </a:prstGeom>
+        </p:spPr>
+        <p:style>
+          <a:lnRef idx="2">
+            <a:schemeClr val="accent1">
+              <a:shade val="50000"/>
+            </a:schemeClr>
+          </a:lnRef>
+          <a:fillRef idx="1">
+            <a:schemeClr val="accent1"/>
+          </a:fillRef>
+          <a:effectRef idx="0">
+            <a:schemeClr val="accent1"/>
+          </a:effectRef>
+          <a:fontRef idx="minor">
+            <a:schemeClr val="lt1"/>
+          </a:fontRef>
+        </p:style>
+        <p:txBody>
+          <a:bodyPr rtlCol="0" anchor="ctr"/>
+          <a:lstStyle/>
+          <a:p>
+            <a:pPr algn="ctr"/>
+            <a:endParaRPr lang="de-DE"/>
+          </a:p>
+        </p:txBody>
+      </p:sp>
+      <p:sp>
+        <p:nvSpPr>
+          <p:cNvPr id="29" name="L-Form 28"/>
+          <p:cNvSpPr/>
+          <p:nvPr/>
+        </p:nvSpPr>
+        <p:spPr>
+          <a:xfrm rot="18846658">
+            <a:off x="8399923" y="2711131"/>
+            <a:ext cx="371123" cy="198452"/>
+          </a:xfrm>
+          <a:prstGeom prst="corner">
+            <a:avLst/>
+          </a:prstGeom>
+        </p:spPr>
+        <p:style>
+          <a:lnRef idx="2">
+            <a:schemeClr val="accent1">
+              <a:shade val="50000"/>
+            </a:schemeClr>
+          </a:lnRef>
+          <a:fillRef idx="1">
+            <a:schemeClr val="accent1"/>
+          </a:fillRef>
+          <a:effectRef idx="0">
+            <a:schemeClr val="accent1"/>
+          </a:effectRef>
+          <a:fontRef idx="minor">
+            <a:schemeClr val="lt1"/>
+          </a:fontRef>
+        </p:style>
+        <p:txBody>
+          <a:bodyPr rtlCol="0" anchor="ctr"/>
+          <a:lstStyle/>
+          <a:p>
+            <a:pPr algn="ctr"/>
+            <a:endParaRPr lang="de-DE"/>
+          </a:p>
+        </p:txBody>
+      </p:sp>
+      <p:sp>
+        <p:nvSpPr>
+          <p:cNvPr id="30" name="L-Form 29"/>
+          <p:cNvSpPr/>
+          <p:nvPr/>
+        </p:nvSpPr>
+        <p:spPr>
+          <a:xfrm rot="18846658">
+            <a:off x="8399924" y="3031734"/>
+            <a:ext cx="371123" cy="198452"/>
+          </a:xfrm>
+          <a:prstGeom prst="corner">
+            <a:avLst/>
+          </a:prstGeom>
+        </p:spPr>
+        <p:style>
+          <a:lnRef idx="2">
+            <a:schemeClr val="accent1">
+              <a:shade val="50000"/>
+            </a:schemeClr>
+          </a:lnRef>
+          <a:fillRef idx="1">
+            <a:schemeClr val="accent1"/>
+          </a:fillRef>
+          <a:effectRef idx="0">
+            <a:schemeClr val="accent1"/>
+          </a:effectRef>
+          <a:fontRef idx="minor">
+            <a:schemeClr val="lt1"/>
+          </a:fontRef>
+        </p:style>
+        <p:txBody>
+          <a:bodyPr rtlCol="0" anchor="ctr"/>
+          <a:lstStyle/>
+          <a:p>
+            <a:pPr algn="ctr"/>
+            <a:endParaRPr lang="de-DE"/>
+          </a:p>
+        </p:txBody>
+      </p:sp>
+      <p:sp>
+        <p:nvSpPr>
+          <p:cNvPr id="31" name="L-Form 30"/>
+          <p:cNvSpPr/>
+          <p:nvPr/>
+        </p:nvSpPr>
+        <p:spPr>
+          <a:xfrm rot="18846658">
+            <a:off x="8399924" y="3383237"/>
+            <a:ext cx="371123" cy="198452"/>
+          </a:xfrm>
+          <a:prstGeom prst="corner">
+            <a:avLst/>
+          </a:prstGeom>
+        </p:spPr>
+        <p:style>
+          <a:lnRef idx="2">
+            <a:schemeClr val="accent1">
+              <a:shade val="50000"/>
+            </a:schemeClr>
+          </a:lnRef>
+          <a:fillRef idx="1">
+            <a:schemeClr val="accent1"/>
+          </a:fillRef>
+          <a:effectRef idx="0">
+            <a:schemeClr val="accent1"/>
+          </a:effectRef>
+          <a:fontRef idx="minor">
+            <a:schemeClr val="lt1"/>
+          </a:fontRef>
+        </p:style>
+        <p:txBody>
+          <a:bodyPr rtlCol="0" anchor="ctr"/>
+          <a:lstStyle/>
+          <a:p>
+            <a:pPr algn="ctr"/>
+            <a:endParaRPr lang="de-DE"/>
+          </a:p>
+        </p:txBody>
+      </p:sp>
+      <p:sp>
+        <p:nvSpPr>
+          <p:cNvPr id="32" name="L-Form 31"/>
+          <p:cNvSpPr/>
+          <p:nvPr/>
+        </p:nvSpPr>
+        <p:spPr>
+          <a:xfrm rot="18846658">
+            <a:off x="8399923" y="3738565"/>
+            <a:ext cx="371123" cy="198452"/>
+          </a:xfrm>
+          <a:prstGeom prst="corner">
+            <a:avLst/>
+          </a:prstGeom>
+        </p:spPr>
+        <p:style>
+          <a:lnRef idx="2">
+            <a:schemeClr val="accent1">
+              <a:shade val="50000"/>
+            </a:schemeClr>
+          </a:lnRef>
+          <a:fillRef idx="1">
+            <a:schemeClr val="accent1"/>
+          </a:fillRef>
+          <a:effectRef idx="0">
+            <a:schemeClr val="accent1"/>
+          </a:effectRef>
+          <a:fontRef idx="minor">
+            <a:schemeClr val="lt1"/>
+          </a:fontRef>
+        </p:style>
+        <p:txBody>
+          <a:bodyPr rtlCol="0" anchor="ctr"/>
+          <a:lstStyle/>
+          <a:p>
+            <a:pPr algn="ctr"/>
+            <a:endParaRPr lang="de-DE"/>
+          </a:p>
+        </p:txBody>
+      </p:sp>
+      <p:sp>
+        <p:nvSpPr>
+          <p:cNvPr id="33" name="L-Form 32"/>
+          <p:cNvSpPr/>
+          <p:nvPr/>
+        </p:nvSpPr>
+        <p:spPr>
+          <a:xfrm rot="18846658">
+            <a:off x="8399922" y="4104859"/>
+            <a:ext cx="371123" cy="198452"/>
+          </a:xfrm>
+          <a:prstGeom prst="corner">
+            <a:avLst/>
+          </a:prstGeom>
+        </p:spPr>
+        <p:style>
+          <a:lnRef idx="2">
+            <a:schemeClr val="accent1">
+              <a:shade val="50000"/>
+            </a:schemeClr>
+          </a:lnRef>
+          <a:fillRef idx="1">
+            <a:schemeClr val="accent1"/>
+          </a:fillRef>
+          <a:effectRef idx="0">
+            <a:schemeClr val="accent1"/>
+          </a:effectRef>
+          <a:fontRef idx="minor">
+            <a:schemeClr val="lt1"/>
+          </a:fontRef>
+        </p:style>
+        <p:txBody>
+          <a:bodyPr rtlCol="0" anchor="ctr"/>
+          <a:lstStyle/>
+          <a:p>
+            <a:pPr algn="ctr"/>
+            <a:endParaRPr lang="de-DE"/>
+          </a:p>
+        </p:txBody>
+      </p:sp>
+      <p:sp>
+        <p:nvSpPr>
+          <p:cNvPr id="34" name="L-Form 33"/>
+          <p:cNvSpPr/>
+          <p:nvPr/>
+        </p:nvSpPr>
+        <p:spPr>
+          <a:xfrm rot="18846658">
+            <a:off x="2025143" y="5129901"/>
+            <a:ext cx="371123" cy="198452"/>
+          </a:xfrm>
+          <a:prstGeom prst="corner">
+            <a:avLst/>
+          </a:prstGeom>
+        </p:spPr>
+        <p:style>
+          <a:lnRef idx="2">
+            <a:schemeClr val="accent1">
+              <a:shade val="50000"/>
+            </a:schemeClr>
+          </a:lnRef>
+          <a:fillRef idx="1">
+            <a:schemeClr val="accent1"/>
+          </a:fillRef>
+          <a:effectRef idx="0">
+            <a:schemeClr val="accent1"/>
+          </a:effectRef>
+          <a:fontRef idx="minor">
+            <a:schemeClr val="lt1"/>
+          </a:fontRef>
+        </p:style>
+        <p:txBody>
+          <a:bodyPr rtlCol="0" anchor="ctr"/>
+          <a:lstStyle/>
+          <a:p>
+            <a:pPr algn="ctr"/>
+            <a:endParaRPr lang="de-DE"/>
+          </a:p>
+        </p:txBody>
+      </p:sp>
+      <p:sp>
+        <p:nvSpPr>
+          <p:cNvPr id="35" name="L-Form 34"/>
+          <p:cNvSpPr/>
+          <p:nvPr/>
+        </p:nvSpPr>
+        <p:spPr>
+          <a:xfrm rot="18846658">
+            <a:off x="2025142" y="5544528"/>
+            <a:ext cx="371123" cy="198452"/>
+          </a:xfrm>
+          <a:prstGeom prst="corner">
+            <a:avLst/>
+          </a:prstGeom>
+        </p:spPr>
+        <p:style>
+          <a:lnRef idx="2">
+            <a:schemeClr val="accent1">
+              <a:shade val="50000"/>
+            </a:schemeClr>
+          </a:lnRef>
+          <a:fillRef idx="1">
+            <a:schemeClr val="accent1"/>
+          </a:fillRef>
+          <a:effectRef idx="0">
+            <a:schemeClr val="accent1"/>
+          </a:effectRef>
+          <a:fontRef idx="minor">
+            <a:schemeClr val="lt1"/>
+          </a:fontRef>
+        </p:style>
+        <p:txBody>
+          <a:bodyPr rtlCol="0" anchor="ctr"/>
+          <a:lstStyle/>
+          <a:p>
+            <a:pPr algn="ctr"/>
+            <a:endParaRPr lang="de-DE"/>
+          </a:p>
+        </p:txBody>
+      </p:sp>
     </p:spTree>
     <p:extLst>
       <p:ext uri="{BB962C8B-B14F-4D97-AF65-F5344CB8AC3E}">
@@ -6088,10 +7612,1904 @@
   <p:clrMapOvr>
     <a:masterClrMapping/>
   </p:clrMapOvr>
+  <p:timing>
+    <p:tnLst>
+      <p:par>
+        <p:cTn id="1" dur="indefinite" restart="never" nodeType="tmRoot">
+          <p:childTnLst>
+            <p:seq concurrent="1" nextAc="seek">
+              <p:cTn id="2" dur="indefinite" nodeType="mainSeq">
+                <p:childTnLst>
+                  <p:par>
+                    <p:cTn id="3" fill="hold">
+                      <p:stCondLst>
+                        <p:cond delay="indefinite"/>
+                      </p:stCondLst>
+                      <p:childTnLst>
+                        <p:par>
+                          <p:cTn id="4" fill="hold">
+                            <p:stCondLst>
+                              <p:cond delay="0"/>
+                            </p:stCondLst>
+                            <p:childTnLst>
+                              <p:par>
+                                <p:cTn id="5" presetID="1" presetClass="entr" presetSubtype="0" fill="hold" grpId="0" nodeType="clickEffect">
+                                  <p:stCondLst>
+                                    <p:cond delay="0"/>
+                                  </p:stCondLst>
+                                  <p:childTnLst>
+                                    <p:set>
+                                      <p:cBhvr>
+                                        <p:cTn id="6" dur="1" fill="hold">
+                                          <p:stCondLst>
+                                            <p:cond delay="0"/>
+                                          </p:stCondLst>
+                                        </p:cTn>
+                                        <p:tgtEl>
+                                          <p:spTgt spid="3">
+                                            <p:txEl>
+                                              <p:pRg st="0" end="0"/>
+                                            </p:txEl>
+                                          </p:spTgt>
+                                        </p:tgtEl>
+                                        <p:attrNameLst>
+                                          <p:attrName>style.visibility</p:attrName>
+                                        </p:attrNameLst>
+                                      </p:cBhvr>
+                                      <p:to>
+                                        <p:strVal val="visible"/>
+                                      </p:to>
+                                    </p:set>
+                                  </p:childTnLst>
+                                </p:cTn>
+                              </p:par>
+                              <p:par>
+                                <p:cTn id="7" presetID="1" presetClass="entr" presetSubtype="0" fill="hold" grpId="0" nodeType="withEffect">
+                                  <p:stCondLst>
+                                    <p:cond delay="0"/>
+                                  </p:stCondLst>
+                                  <p:childTnLst>
+                                    <p:set>
+                                      <p:cBhvr>
+                                        <p:cTn id="8" dur="1" fill="hold">
+                                          <p:stCondLst>
+                                            <p:cond delay="0"/>
+                                          </p:stCondLst>
+                                        </p:cTn>
+                                        <p:tgtEl>
+                                          <p:spTgt spid="3">
+                                            <p:txEl>
+                                              <p:pRg st="1" end="1"/>
+                                            </p:txEl>
+                                          </p:spTgt>
+                                        </p:tgtEl>
+                                        <p:attrNameLst>
+                                          <p:attrName>style.visibility</p:attrName>
+                                        </p:attrNameLst>
+                                      </p:cBhvr>
+                                      <p:to>
+                                        <p:strVal val="visible"/>
+                                      </p:to>
+                                    </p:set>
+                                  </p:childTnLst>
+                                </p:cTn>
+                              </p:par>
+                              <p:par>
+                                <p:cTn id="9" presetID="1" presetClass="entr" presetSubtype="0" fill="hold" grpId="0" nodeType="withEffect">
+                                  <p:stCondLst>
+                                    <p:cond delay="0"/>
+                                  </p:stCondLst>
+                                  <p:childTnLst>
+                                    <p:set>
+                                      <p:cBhvr>
+                                        <p:cTn id="10" dur="1" fill="hold">
+                                          <p:stCondLst>
+                                            <p:cond delay="0"/>
+                                          </p:stCondLst>
+                                        </p:cTn>
+                                        <p:tgtEl>
+                                          <p:spTgt spid="3">
+                                            <p:txEl>
+                                              <p:pRg st="2" end="2"/>
+                                            </p:txEl>
+                                          </p:spTgt>
+                                        </p:tgtEl>
+                                        <p:attrNameLst>
+                                          <p:attrName>style.visibility</p:attrName>
+                                        </p:attrNameLst>
+                                      </p:cBhvr>
+                                      <p:to>
+                                        <p:strVal val="visible"/>
+                                      </p:to>
+                                    </p:set>
+                                  </p:childTnLst>
+                                </p:cTn>
+                              </p:par>
+                              <p:par>
+                                <p:cTn id="11" presetID="1" presetClass="entr" presetSubtype="0" fill="hold" grpId="0" nodeType="withEffect">
+                                  <p:stCondLst>
+                                    <p:cond delay="0"/>
+                                  </p:stCondLst>
+                                  <p:childTnLst>
+                                    <p:set>
+                                      <p:cBhvr>
+                                        <p:cTn id="12" dur="1" fill="hold">
+                                          <p:stCondLst>
+                                            <p:cond delay="0"/>
+                                          </p:stCondLst>
+                                        </p:cTn>
+                                        <p:tgtEl>
+                                          <p:spTgt spid="3">
+                                            <p:txEl>
+                                              <p:pRg st="3" end="3"/>
+                                            </p:txEl>
+                                          </p:spTgt>
+                                        </p:tgtEl>
+                                        <p:attrNameLst>
+                                          <p:attrName>style.visibility</p:attrName>
+                                        </p:attrNameLst>
+                                      </p:cBhvr>
+                                      <p:to>
+                                        <p:strVal val="visible"/>
+                                      </p:to>
+                                    </p:set>
+                                  </p:childTnLst>
+                                </p:cTn>
+                              </p:par>
+                              <p:par>
+                                <p:cTn id="13" presetID="1" presetClass="entr" presetSubtype="0" fill="hold" grpId="0" nodeType="withEffect">
+                                  <p:stCondLst>
+                                    <p:cond delay="0"/>
+                                  </p:stCondLst>
+                                  <p:childTnLst>
+                                    <p:set>
+                                      <p:cBhvr>
+                                        <p:cTn id="14" dur="1" fill="hold">
+                                          <p:stCondLst>
+                                            <p:cond delay="0"/>
+                                          </p:stCondLst>
+                                        </p:cTn>
+                                        <p:tgtEl>
+                                          <p:spTgt spid="3">
+                                            <p:txEl>
+                                              <p:pRg st="4" end="4"/>
+                                            </p:txEl>
+                                          </p:spTgt>
+                                        </p:tgtEl>
+                                        <p:attrNameLst>
+                                          <p:attrName>style.visibility</p:attrName>
+                                        </p:attrNameLst>
+                                      </p:cBhvr>
+                                      <p:to>
+                                        <p:strVal val="visible"/>
+                                      </p:to>
+                                    </p:set>
+                                  </p:childTnLst>
+                                </p:cTn>
+                              </p:par>
+                              <p:par>
+                                <p:cTn id="15" presetID="1" presetClass="entr" presetSubtype="0" fill="hold" grpId="0" nodeType="withEffect">
+                                  <p:stCondLst>
+                                    <p:cond delay="0"/>
+                                  </p:stCondLst>
+                                  <p:childTnLst>
+                                    <p:set>
+                                      <p:cBhvr>
+                                        <p:cTn id="16" dur="1" fill="hold">
+                                          <p:stCondLst>
+                                            <p:cond delay="0"/>
+                                          </p:stCondLst>
+                                        </p:cTn>
+                                        <p:tgtEl>
+                                          <p:spTgt spid="3">
+                                            <p:txEl>
+                                              <p:pRg st="5" end="5"/>
+                                            </p:txEl>
+                                          </p:spTgt>
+                                        </p:tgtEl>
+                                        <p:attrNameLst>
+                                          <p:attrName>style.visibility</p:attrName>
+                                        </p:attrNameLst>
+                                      </p:cBhvr>
+                                      <p:to>
+                                        <p:strVal val="visible"/>
+                                      </p:to>
+                                    </p:set>
+                                  </p:childTnLst>
+                                </p:cTn>
+                              </p:par>
+                              <p:par>
+                                <p:cTn id="17" presetID="1" presetClass="entr" presetSubtype="0" fill="hold" grpId="0" nodeType="withEffect">
+                                  <p:stCondLst>
+                                    <p:cond delay="0"/>
+                                  </p:stCondLst>
+                                  <p:childTnLst>
+                                    <p:set>
+                                      <p:cBhvr>
+                                        <p:cTn id="18" dur="1" fill="hold">
+                                          <p:stCondLst>
+                                            <p:cond delay="0"/>
+                                          </p:stCondLst>
+                                        </p:cTn>
+                                        <p:tgtEl>
+                                          <p:spTgt spid="3">
+                                            <p:txEl>
+                                              <p:pRg st="6" end="6"/>
+                                            </p:txEl>
+                                          </p:spTgt>
+                                        </p:tgtEl>
+                                        <p:attrNameLst>
+                                          <p:attrName>style.visibility</p:attrName>
+                                        </p:attrNameLst>
+                                      </p:cBhvr>
+                                      <p:to>
+                                        <p:strVal val="visible"/>
+                                      </p:to>
+                                    </p:set>
+                                  </p:childTnLst>
+                                </p:cTn>
+                              </p:par>
+                              <p:par>
+                                <p:cTn id="19" presetID="1" presetClass="entr" presetSubtype="0" fill="hold" grpId="0" nodeType="withEffect">
+                                  <p:stCondLst>
+                                    <p:cond delay="0"/>
+                                  </p:stCondLst>
+                                  <p:childTnLst>
+                                    <p:set>
+                                      <p:cBhvr>
+                                        <p:cTn id="20" dur="1" fill="hold">
+                                          <p:stCondLst>
+                                            <p:cond delay="0"/>
+                                          </p:stCondLst>
+                                        </p:cTn>
+                                        <p:tgtEl>
+                                          <p:spTgt spid="3">
+                                            <p:txEl>
+                                              <p:pRg st="7" end="7"/>
+                                            </p:txEl>
+                                          </p:spTgt>
+                                        </p:tgtEl>
+                                        <p:attrNameLst>
+                                          <p:attrName>style.visibility</p:attrName>
+                                        </p:attrNameLst>
+                                      </p:cBhvr>
+                                      <p:to>
+                                        <p:strVal val="visible"/>
+                                      </p:to>
+                                    </p:set>
+                                  </p:childTnLst>
+                                </p:cTn>
+                              </p:par>
+                            </p:childTnLst>
+                          </p:cTn>
+                        </p:par>
+                      </p:childTnLst>
+                    </p:cTn>
+                  </p:par>
+                  <p:par>
+                    <p:cTn id="21" fill="hold">
+                      <p:stCondLst>
+                        <p:cond delay="indefinite"/>
+                      </p:stCondLst>
+                      <p:childTnLst>
+                        <p:par>
+                          <p:cTn id="22" fill="hold">
+                            <p:stCondLst>
+                              <p:cond delay="0"/>
+                            </p:stCondLst>
+                            <p:childTnLst>
+                              <p:par>
+                                <p:cTn id="23" presetID="1" presetClass="entr" presetSubtype="0" fill="hold" grpId="0" nodeType="clickEffect">
+                                  <p:stCondLst>
+                                    <p:cond delay="0"/>
+                                  </p:stCondLst>
+                                  <p:childTnLst>
+                                    <p:set>
+                                      <p:cBhvr>
+                                        <p:cTn id="24" dur="1" fill="hold">
+                                          <p:stCondLst>
+                                            <p:cond delay="0"/>
+                                          </p:stCondLst>
+                                        </p:cTn>
+                                        <p:tgtEl>
+                                          <p:spTgt spid="17"/>
+                                        </p:tgtEl>
+                                        <p:attrNameLst>
+                                          <p:attrName>style.visibility</p:attrName>
+                                        </p:attrNameLst>
+                                      </p:cBhvr>
+                                      <p:to>
+                                        <p:strVal val="visible"/>
+                                      </p:to>
+                                    </p:set>
+                                  </p:childTnLst>
+                                </p:cTn>
+                              </p:par>
+                            </p:childTnLst>
+                          </p:cTn>
+                        </p:par>
+                      </p:childTnLst>
+                    </p:cTn>
+                  </p:par>
+                  <p:par>
+                    <p:cTn id="25" fill="hold">
+                      <p:stCondLst>
+                        <p:cond delay="indefinite"/>
+                      </p:stCondLst>
+                      <p:childTnLst>
+                        <p:par>
+                          <p:cTn id="26" fill="hold">
+                            <p:stCondLst>
+                              <p:cond delay="0"/>
+                            </p:stCondLst>
+                            <p:childTnLst>
+                              <p:par>
+                                <p:cTn id="27" presetID="1" presetClass="entr" presetSubtype="0" fill="hold" grpId="0" nodeType="clickEffect">
+                                  <p:stCondLst>
+                                    <p:cond delay="0"/>
+                                  </p:stCondLst>
+                                  <p:childTnLst>
+                                    <p:set>
+                                      <p:cBhvr>
+                                        <p:cTn id="28" dur="1" fill="hold">
+                                          <p:stCondLst>
+                                            <p:cond delay="0"/>
+                                          </p:stCondLst>
+                                        </p:cTn>
+                                        <p:tgtEl>
+                                          <p:spTgt spid="19"/>
+                                        </p:tgtEl>
+                                        <p:attrNameLst>
+                                          <p:attrName>style.visibility</p:attrName>
+                                        </p:attrNameLst>
+                                      </p:cBhvr>
+                                      <p:to>
+                                        <p:strVal val="visible"/>
+                                      </p:to>
+                                    </p:set>
+                                  </p:childTnLst>
+                                </p:cTn>
+                              </p:par>
+                            </p:childTnLst>
+                          </p:cTn>
+                        </p:par>
+                      </p:childTnLst>
+                    </p:cTn>
+                  </p:par>
+                  <p:par>
+                    <p:cTn id="29" fill="hold">
+                      <p:stCondLst>
+                        <p:cond delay="indefinite"/>
+                      </p:stCondLst>
+                      <p:childTnLst>
+                        <p:par>
+                          <p:cTn id="30" fill="hold">
+                            <p:stCondLst>
+                              <p:cond delay="0"/>
+                            </p:stCondLst>
+                            <p:childTnLst>
+                              <p:par>
+                                <p:cTn id="31" presetID="42" presetClass="entr" presetSubtype="0" fill="hold" grpId="0" nodeType="clickEffect">
+                                  <p:stCondLst>
+                                    <p:cond delay="0"/>
+                                  </p:stCondLst>
+                                  <p:childTnLst>
+                                    <p:set>
+                                      <p:cBhvr>
+                                        <p:cTn id="32" dur="1" fill="hold">
+                                          <p:stCondLst>
+                                            <p:cond delay="0"/>
+                                          </p:stCondLst>
+                                        </p:cTn>
+                                        <p:tgtEl>
+                                          <p:spTgt spid="7"/>
+                                        </p:tgtEl>
+                                        <p:attrNameLst>
+                                          <p:attrName>style.visibility</p:attrName>
+                                        </p:attrNameLst>
+                                      </p:cBhvr>
+                                      <p:to>
+                                        <p:strVal val="visible"/>
+                                      </p:to>
+                                    </p:set>
+                                    <p:animEffect transition="in" filter="fade">
+                                      <p:cBhvr>
+                                        <p:cTn id="33" dur="500"/>
+                                        <p:tgtEl>
+                                          <p:spTgt spid="7"/>
+                                        </p:tgtEl>
+                                      </p:cBhvr>
+                                    </p:animEffect>
+                                    <p:anim calcmode="lin" valueType="num">
+                                      <p:cBhvr>
+                                        <p:cTn id="34" dur="500" fill="hold"/>
+                                        <p:tgtEl>
+                                          <p:spTgt spid="7"/>
+                                        </p:tgtEl>
+                                        <p:attrNameLst>
+                                          <p:attrName>ppt_x</p:attrName>
+                                        </p:attrNameLst>
+                                      </p:cBhvr>
+                                      <p:tavLst>
+                                        <p:tav tm="0">
+                                          <p:val>
+                                            <p:strVal val="#ppt_x"/>
+                                          </p:val>
+                                        </p:tav>
+                                        <p:tav tm="100000">
+                                          <p:val>
+                                            <p:strVal val="#ppt_x"/>
+                                          </p:val>
+                                        </p:tav>
+                                      </p:tavLst>
+                                    </p:anim>
+                                    <p:anim calcmode="lin" valueType="num">
+                                      <p:cBhvr>
+                                        <p:cTn id="35" dur="500" fill="hold"/>
+                                        <p:tgtEl>
+                                          <p:spTgt spid="7"/>
+                                        </p:tgtEl>
+                                        <p:attrNameLst>
+                                          <p:attrName>ppt_y</p:attrName>
+                                        </p:attrNameLst>
+                                      </p:cBhvr>
+                                      <p:tavLst>
+                                        <p:tav tm="0">
+                                          <p:val>
+                                            <p:strVal val="#ppt_y+.1"/>
+                                          </p:val>
+                                        </p:tav>
+                                        <p:tav tm="100000">
+                                          <p:val>
+                                            <p:strVal val="#ppt_y"/>
+                                          </p:val>
+                                        </p:tav>
+                                      </p:tavLst>
+                                    </p:anim>
+                                  </p:childTnLst>
+                                </p:cTn>
+                              </p:par>
+                              <p:par>
+                                <p:cTn id="36" presetID="42" presetClass="entr" presetSubtype="0" fill="hold" grpId="0" nodeType="withEffect">
+                                  <p:stCondLst>
+                                    <p:cond delay="0"/>
+                                  </p:stCondLst>
+                                  <p:childTnLst>
+                                    <p:set>
+                                      <p:cBhvr>
+                                        <p:cTn id="37" dur="1" fill="hold">
+                                          <p:stCondLst>
+                                            <p:cond delay="0"/>
+                                          </p:stCondLst>
+                                        </p:cTn>
+                                        <p:tgtEl>
+                                          <p:spTgt spid="20"/>
+                                        </p:tgtEl>
+                                        <p:attrNameLst>
+                                          <p:attrName>style.visibility</p:attrName>
+                                        </p:attrNameLst>
+                                      </p:cBhvr>
+                                      <p:to>
+                                        <p:strVal val="visible"/>
+                                      </p:to>
+                                    </p:set>
+                                    <p:animEffect transition="in" filter="fade">
+                                      <p:cBhvr>
+                                        <p:cTn id="38" dur="500"/>
+                                        <p:tgtEl>
+                                          <p:spTgt spid="20"/>
+                                        </p:tgtEl>
+                                      </p:cBhvr>
+                                    </p:animEffect>
+                                    <p:anim calcmode="lin" valueType="num">
+                                      <p:cBhvr>
+                                        <p:cTn id="39" dur="500" fill="hold"/>
+                                        <p:tgtEl>
+                                          <p:spTgt spid="20"/>
+                                        </p:tgtEl>
+                                        <p:attrNameLst>
+                                          <p:attrName>ppt_x</p:attrName>
+                                        </p:attrNameLst>
+                                      </p:cBhvr>
+                                      <p:tavLst>
+                                        <p:tav tm="0">
+                                          <p:val>
+                                            <p:strVal val="#ppt_x"/>
+                                          </p:val>
+                                        </p:tav>
+                                        <p:tav tm="100000">
+                                          <p:val>
+                                            <p:strVal val="#ppt_x"/>
+                                          </p:val>
+                                        </p:tav>
+                                      </p:tavLst>
+                                    </p:anim>
+                                    <p:anim calcmode="lin" valueType="num">
+                                      <p:cBhvr>
+                                        <p:cTn id="40" dur="500" fill="hold"/>
+                                        <p:tgtEl>
+                                          <p:spTgt spid="20"/>
+                                        </p:tgtEl>
+                                        <p:attrNameLst>
+                                          <p:attrName>ppt_y</p:attrName>
+                                        </p:attrNameLst>
+                                      </p:cBhvr>
+                                      <p:tavLst>
+                                        <p:tav tm="0">
+                                          <p:val>
+                                            <p:strVal val="#ppt_y+.1"/>
+                                          </p:val>
+                                        </p:tav>
+                                        <p:tav tm="100000">
+                                          <p:val>
+                                            <p:strVal val="#ppt_y"/>
+                                          </p:val>
+                                        </p:tav>
+                                      </p:tavLst>
+                                    </p:anim>
+                                  </p:childTnLst>
+                                </p:cTn>
+                              </p:par>
+                              <p:par>
+                                <p:cTn id="41" presetID="42" presetClass="entr" presetSubtype="0" fill="hold" grpId="0" nodeType="withEffect">
+                                  <p:stCondLst>
+                                    <p:cond delay="0"/>
+                                  </p:stCondLst>
+                                  <p:childTnLst>
+                                    <p:set>
+                                      <p:cBhvr>
+                                        <p:cTn id="42" dur="1" fill="hold">
+                                          <p:stCondLst>
+                                            <p:cond delay="0"/>
+                                          </p:stCondLst>
+                                        </p:cTn>
+                                        <p:tgtEl>
+                                          <p:spTgt spid="21"/>
+                                        </p:tgtEl>
+                                        <p:attrNameLst>
+                                          <p:attrName>style.visibility</p:attrName>
+                                        </p:attrNameLst>
+                                      </p:cBhvr>
+                                      <p:to>
+                                        <p:strVal val="visible"/>
+                                      </p:to>
+                                    </p:set>
+                                    <p:animEffect transition="in" filter="fade">
+                                      <p:cBhvr>
+                                        <p:cTn id="43" dur="500"/>
+                                        <p:tgtEl>
+                                          <p:spTgt spid="21"/>
+                                        </p:tgtEl>
+                                      </p:cBhvr>
+                                    </p:animEffect>
+                                    <p:anim calcmode="lin" valueType="num">
+                                      <p:cBhvr>
+                                        <p:cTn id="44" dur="500" fill="hold"/>
+                                        <p:tgtEl>
+                                          <p:spTgt spid="21"/>
+                                        </p:tgtEl>
+                                        <p:attrNameLst>
+                                          <p:attrName>ppt_x</p:attrName>
+                                        </p:attrNameLst>
+                                      </p:cBhvr>
+                                      <p:tavLst>
+                                        <p:tav tm="0">
+                                          <p:val>
+                                            <p:strVal val="#ppt_x"/>
+                                          </p:val>
+                                        </p:tav>
+                                        <p:tav tm="100000">
+                                          <p:val>
+                                            <p:strVal val="#ppt_x"/>
+                                          </p:val>
+                                        </p:tav>
+                                      </p:tavLst>
+                                    </p:anim>
+                                    <p:anim calcmode="lin" valueType="num">
+                                      <p:cBhvr>
+                                        <p:cTn id="45" dur="500" fill="hold"/>
+                                        <p:tgtEl>
+                                          <p:spTgt spid="21"/>
+                                        </p:tgtEl>
+                                        <p:attrNameLst>
+                                          <p:attrName>ppt_y</p:attrName>
+                                        </p:attrNameLst>
+                                      </p:cBhvr>
+                                      <p:tavLst>
+                                        <p:tav tm="0">
+                                          <p:val>
+                                            <p:strVal val="#ppt_y+.1"/>
+                                          </p:val>
+                                        </p:tav>
+                                        <p:tav tm="100000">
+                                          <p:val>
+                                            <p:strVal val="#ppt_y"/>
+                                          </p:val>
+                                        </p:tav>
+                                      </p:tavLst>
+                                    </p:anim>
+                                  </p:childTnLst>
+                                </p:cTn>
+                              </p:par>
+                              <p:par>
+                                <p:cTn id="46" presetID="42" presetClass="entr" presetSubtype="0" fill="hold" grpId="0" nodeType="withEffect">
+                                  <p:stCondLst>
+                                    <p:cond delay="0"/>
+                                  </p:stCondLst>
+                                  <p:childTnLst>
+                                    <p:set>
+                                      <p:cBhvr>
+                                        <p:cTn id="47" dur="1" fill="hold">
+                                          <p:stCondLst>
+                                            <p:cond delay="0"/>
+                                          </p:stCondLst>
+                                        </p:cTn>
+                                        <p:tgtEl>
+                                          <p:spTgt spid="22"/>
+                                        </p:tgtEl>
+                                        <p:attrNameLst>
+                                          <p:attrName>style.visibility</p:attrName>
+                                        </p:attrNameLst>
+                                      </p:cBhvr>
+                                      <p:to>
+                                        <p:strVal val="visible"/>
+                                      </p:to>
+                                    </p:set>
+                                    <p:animEffect transition="in" filter="fade">
+                                      <p:cBhvr>
+                                        <p:cTn id="48" dur="500"/>
+                                        <p:tgtEl>
+                                          <p:spTgt spid="22"/>
+                                        </p:tgtEl>
+                                      </p:cBhvr>
+                                    </p:animEffect>
+                                    <p:anim calcmode="lin" valueType="num">
+                                      <p:cBhvr>
+                                        <p:cTn id="49" dur="500" fill="hold"/>
+                                        <p:tgtEl>
+                                          <p:spTgt spid="22"/>
+                                        </p:tgtEl>
+                                        <p:attrNameLst>
+                                          <p:attrName>ppt_x</p:attrName>
+                                        </p:attrNameLst>
+                                      </p:cBhvr>
+                                      <p:tavLst>
+                                        <p:tav tm="0">
+                                          <p:val>
+                                            <p:strVal val="#ppt_x"/>
+                                          </p:val>
+                                        </p:tav>
+                                        <p:tav tm="100000">
+                                          <p:val>
+                                            <p:strVal val="#ppt_x"/>
+                                          </p:val>
+                                        </p:tav>
+                                      </p:tavLst>
+                                    </p:anim>
+                                    <p:anim calcmode="lin" valueType="num">
+                                      <p:cBhvr>
+                                        <p:cTn id="50" dur="500" fill="hold"/>
+                                        <p:tgtEl>
+                                          <p:spTgt spid="22"/>
+                                        </p:tgtEl>
+                                        <p:attrNameLst>
+                                          <p:attrName>ppt_y</p:attrName>
+                                        </p:attrNameLst>
+                                      </p:cBhvr>
+                                      <p:tavLst>
+                                        <p:tav tm="0">
+                                          <p:val>
+                                            <p:strVal val="#ppt_y+.1"/>
+                                          </p:val>
+                                        </p:tav>
+                                        <p:tav tm="100000">
+                                          <p:val>
+                                            <p:strVal val="#ppt_y"/>
+                                          </p:val>
+                                        </p:tav>
+                                      </p:tavLst>
+                                    </p:anim>
+                                  </p:childTnLst>
+                                </p:cTn>
+                              </p:par>
+                              <p:par>
+                                <p:cTn id="51" presetID="42" presetClass="entr" presetSubtype="0" fill="hold" grpId="0" nodeType="withEffect">
+                                  <p:stCondLst>
+                                    <p:cond delay="0"/>
+                                  </p:stCondLst>
+                                  <p:childTnLst>
+                                    <p:set>
+                                      <p:cBhvr>
+                                        <p:cTn id="52" dur="1" fill="hold">
+                                          <p:stCondLst>
+                                            <p:cond delay="0"/>
+                                          </p:stCondLst>
+                                        </p:cTn>
+                                        <p:tgtEl>
+                                          <p:spTgt spid="23"/>
+                                        </p:tgtEl>
+                                        <p:attrNameLst>
+                                          <p:attrName>style.visibility</p:attrName>
+                                        </p:attrNameLst>
+                                      </p:cBhvr>
+                                      <p:to>
+                                        <p:strVal val="visible"/>
+                                      </p:to>
+                                    </p:set>
+                                    <p:animEffect transition="in" filter="fade">
+                                      <p:cBhvr>
+                                        <p:cTn id="53" dur="500"/>
+                                        <p:tgtEl>
+                                          <p:spTgt spid="23"/>
+                                        </p:tgtEl>
+                                      </p:cBhvr>
+                                    </p:animEffect>
+                                    <p:anim calcmode="lin" valueType="num">
+                                      <p:cBhvr>
+                                        <p:cTn id="54" dur="500" fill="hold"/>
+                                        <p:tgtEl>
+                                          <p:spTgt spid="23"/>
+                                        </p:tgtEl>
+                                        <p:attrNameLst>
+                                          <p:attrName>ppt_x</p:attrName>
+                                        </p:attrNameLst>
+                                      </p:cBhvr>
+                                      <p:tavLst>
+                                        <p:tav tm="0">
+                                          <p:val>
+                                            <p:strVal val="#ppt_x"/>
+                                          </p:val>
+                                        </p:tav>
+                                        <p:tav tm="100000">
+                                          <p:val>
+                                            <p:strVal val="#ppt_x"/>
+                                          </p:val>
+                                        </p:tav>
+                                      </p:tavLst>
+                                    </p:anim>
+                                    <p:anim calcmode="lin" valueType="num">
+                                      <p:cBhvr>
+                                        <p:cTn id="55" dur="500" fill="hold"/>
+                                        <p:tgtEl>
+                                          <p:spTgt spid="23"/>
+                                        </p:tgtEl>
+                                        <p:attrNameLst>
+                                          <p:attrName>ppt_y</p:attrName>
+                                        </p:attrNameLst>
+                                      </p:cBhvr>
+                                      <p:tavLst>
+                                        <p:tav tm="0">
+                                          <p:val>
+                                            <p:strVal val="#ppt_y+.1"/>
+                                          </p:val>
+                                        </p:tav>
+                                        <p:tav tm="100000">
+                                          <p:val>
+                                            <p:strVal val="#ppt_y"/>
+                                          </p:val>
+                                        </p:tav>
+                                      </p:tavLst>
+                                    </p:anim>
+                                  </p:childTnLst>
+                                </p:cTn>
+                              </p:par>
+                              <p:par>
+                                <p:cTn id="56" presetID="42" presetClass="entr" presetSubtype="0" fill="hold" grpId="0" nodeType="withEffect">
+                                  <p:stCondLst>
+                                    <p:cond delay="0"/>
+                                  </p:stCondLst>
+                                  <p:childTnLst>
+                                    <p:set>
+                                      <p:cBhvr>
+                                        <p:cTn id="57" dur="1" fill="hold">
+                                          <p:stCondLst>
+                                            <p:cond delay="0"/>
+                                          </p:stCondLst>
+                                        </p:cTn>
+                                        <p:tgtEl>
+                                          <p:spTgt spid="24"/>
+                                        </p:tgtEl>
+                                        <p:attrNameLst>
+                                          <p:attrName>style.visibility</p:attrName>
+                                        </p:attrNameLst>
+                                      </p:cBhvr>
+                                      <p:to>
+                                        <p:strVal val="visible"/>
+                                      </p:to>
+                                    </p:set>
+                                    <p:animEffect transition="in" filter="fade">
+                                      <p:cBhvr>
+                                        <p:cTn id="58" dur="500"/>
+                                        <p:tgtEl>
+                                          <p:spTgt spid="24"/>
+                                        </p:tgtEl>
+                                      </p:cBhvr>
+                                    </p:animEffect>
+                                    <p:anim calcmode="lin" valueType="num">
+                                      <p:cBhvr>
+                                        <p:cTn id="59" dur="500" fill="hold"/>
+                                        <p:tgtEl>
+                                          <p:spTgt spid="24"/>
+                                        </p:tgtEl>
+                                        <p:attrNameLst>
+                                          <p:attrName>ppt_x</p:attrName>
+                                        </p:attrNameLst>
+                                      </p:cBhvr>
+                                      <p:tavLst>
+                                        <p:tav tm="0">
+                                          <p:val>
+                                            <p:strVal val="#ppt_x"/>
+                                          </p:val>
+                                        </p:tav>
+                                        <p:tav tm="100000">
+                                          <p:val>
+                                            <p:strVal val="#ppt_x"/>
+                                          </p:val>
+                                        </p:tav>
+                                      </p:tavLst>
+                                    </p:anim>
+                                    <p:anim calcmode="lin" valueType="num">
+                                      <p:cBhvr>
+                                        <p:cTn id="60" dur="500" fill="hold"/>
+                                        <p:tgtEl>
+                                          <p:spTgt spid="24"/>
+                                        </p:tgtEl>
+                                        <p:attrNameLst>
+                                          <p:attrName>ppt_y</p:attrName>
+                                        </p:attrNameLst>
+                                      </p:cBhvr>
+                                      <p:tavLst>
+                                        <p:tav tm="0">
+                                          <p:val>
+                                            <p:strVal val="#ppt_y+.1"/>
+                                          </p:val>
+                                        </p:tav>
+                                        <p:tav tm="100000">
+                                          <p:val>
+                                            <p:strVal val="#ppt_y"/>
+                                          </p:val>
+                                        </p:tav>
+                                      </p:tavLst>
+                                    </p:anim>
+                                  </p:childTnLst>
+                                </p:cTn>
+                              </p:par>
+                              <p:par>
+                                <p:cTn id="61" presetID="42" presetClass="entr" presetSubtype="0" fill="hold" grpId="0" nodeType="withEffect">
+                                  <p:stCondLst>
+                                    <p:cond delay="0"/>
+                                  </p:stCondLst>
+                                  <p:childTnLst>
+                                    <p:set>
+                                      <p:cBhvr>
+                                        <p:cTn id="62" dur="1" fill="hold">
+                                          <p:stCondLst>
+                                            <p:cond delay="0"/>
+                                          </p:stCondLst>
+                                        </p:cTn>
+                                        <p:tgtEl>
+                                          <p:spTgt spid="25"/>
+                                        </p:tgtEl>
+                                        <p:attrNameLst>
+                                          <p:attrName>style.visibility</p:attrName>
+                                        </p:attrNameLst>
+                                      </p:cBhvr>
+                                      <p:to>
+                                        <p:strVal val="visible"/>
+                                      </p:to>
+                                    </p:set>
+                                    <p:animEffect transition="in" filter="fade">
+                                      <p:cBhvr>
+                                        <p:cTn id="63" dur="500"/>
+                                        <p:tgtEl>
+                                          <p:spTgt spid="25"/>
+                                        </p:tgtEl>
+                                      </p:cBhvr>
+                                    </p:animEffect>
+                                    <p:anim calcmode="lin" valueType="num">
+                                      <p:cBhvr>
+                                        <p:cTn id="64" dur="500" fill="hold"/>
+                                        <p:tgtEl>
+                                          <p:spTgt spid="25"/>
+                                        </p:tgtEl>
+                                        <p:attrNameLst>
+                                          <p:attrName>ppt_x</p:attrName>
+                                        </p:attrNameLst>
+                                      </p:cBhvr>
+                                      <p:tavLst>
+                                        <p:tav tm="0">
+                                          <p:val>
+                                            <p:strVal val="#ppt_x"/>
+                                          </p:val>
+                                        </p:tav>
+                                        <p:tav tm="100000">
+                                          <p:val>
+                                            <p:strVal val="#ppt_x"/>
+                                          </p:val>
+                                        </p:tav>
+                                      </p:tavLst>
+                                    </p:anim>
+                                    <p:anim calcmode="lin" valueType="num">
+                                      <p:cBhvr>
+                                        <p:cTn id="65" dur="500" fill="hold"/>
+                                        <p:tgtEl>
+                                          <p:spTgt spid="25"/>
+                                        </p:tgtEl>
+                                        <p:attrNameLst>
+                                          <p:attrName>ppt_y</p:attrName>
+                                        </p:attrNameLst>
+                                      </p:cBhvr>
+                                      <p:tavLst>
+                                        <p:tav tm="0">
+                                          <p:val>
+                                            <p:strVal val="#ppt_y+.1"/>
+                                          </p:val>
+                                        </p:tav>
+                                        <p:tav tm="100000">
+                                          <p:val>
+                                            <p:strVal val="#ppt_y"/>
+                                          </p:val>
+                                        </p:tav>
+                                      </p:tavLst>
+                                    </p:anim>
+                                  </p:childTnLst>
+                                </p:cTn>
+                              </p:par>
+                              <p:par>
+                                <p:cTn id="66" presetID="42" presetClass="entr" presetSubtype="0" fill="hold" grpId="0" nodeType="withEffect">
+                                  <p:stCondLst>
+                                    <p:cond delay="0"/>
+                                  </p:stCondLst>
+                                  <p:childTnLst>
+                                    <p:set>
+                                      <p:cBhvr>
+                                        <p:cTn id="67" dur="1" fill="hold">
+                                          <p:stCondLst>
+                                            <p:cond delay="0"/>
+                                          </p:stCondLst>
+                                        </p:cTn>
+                                        <p:tgtEl>
+                                          <p:spTgt spid="26"/>
+                                        </p:tgtEl>
+                                        <p:attrNameLst>
+                                          <p:attrName>style.visibility</p:attrName>
+                                        </p:attrNameLst>
+                                      </p:cBhvr>
+                                      <p:to>
+                                        <p:strVal val="visible"/>
+                                      </p:to>
+                                    </p:set>
+                                    <p:animEffect transition="in" filter="fade">
+                                      <p:cBhvr>
+                                        <p:cTn id="68" dur="500"/>
+                                        <p:tgtEl>
+                                          <p:spTgt spid="26"/>
+                                        </p:tgtEl>
+                                      </p:cBhvr>
+                                    </p:animEffect>
+                                    <p:anim calcmode="lin" valueType="num">
+                                      <p:cBhvr>
+                                        <p:cTn id="69" dur="500" fill="hold"/>
+                                        <p:tgtEl>
+                                          <p:spTgt spid="26"/>
+                                        </p:tgtEl>
+                                        <p:attrNameLst>
+                                          <p:attrName>ppt_x</p:attrName>
+                                        </p:attrNameLst>
+                                      </p:cBhvr>
+                                      <p:tavLst>
+                                        <p:tav tm="0">
+                                          <p:val>
+                                            <p:strVal val="#ppt_x"/>
+                                          </p:val>
+                                        </p:tav>
+                                        <p:tav tm="100000">
+                                          <p:val>
+                                            <p:strVal val="#ppt_x"/>
+                                          </p:val>
+                                        </p:tav>
+                                      </p:tavLst>
+                                    </p:anim>
+                                    <p:anim calcmode="lin" valueType="num">
+                                      <p:cBhvr>
+                                        <p:cTn id="70" dur="500" fill="hold"/>
+                                        <p:tgtEl>
+                                          <p:spTgt spid="26"/>
+                                        </p:tgtEl>
+                                        <p:attrNameLst>
+                                          <p:attrName>ppt_y</p:attrName>
+                                        </p:attrNameLst>
+                                      </p:cBhvr>
+                                      <p:tavLst>
+                                        <p:tav tm="0">
+                                          <p:val>
+                                            <p:strVal val="#ppt_y+.1"/>
+                                          </p:val>
+                                        </p:tav>
+                                        <p:tav tm="100000">
+                                          <p:val>
+                                            <p:strVal val="#ppt_y"/>
+                                          </p:val>
+                                        </p:tav>
+                                      </p:tavLst>
+                                    </p:anim>
+                                  </p:childTnLst>
+                                </p:cTn>
+                              </p:par>
+                              <p:par>
+                                <p:cTn id="71" presetID="42" presetClass="entr" presetSubtype="0" fill="hold" grpId="0" nodeType="withEffect">
+                                  <p:stCondLst>
+                                    <p:cond delay="0"/>
+                                  </p:stCondLst>
+                                  <p:childTnLst>
+                                    <p:set>
+                                      <p:cBhvr>
+                                        <p:cTn id="72" dur="1" fill="hold">
+                                          <p:stCondLst>
+                                            <p:cond delay="0"/>
+                                          </p:stCondLst>
+                                        </p:cTn>
+                                        <p:tgtEl>
+                                          <p:spTgt spid="27"/>
+                                        </p:tgtEl>
+                                        <p:attrNameLst>
+                                          <p:attrName>style.visibility</p:attrName>
+                                        </p:attrNameLst>
+                                      </p:cBhvr>
+                                      <p:to>
+                                        <p:strVal val="visible"/>
+                                      </p:to>
+                                    </p:set>
+                                    <p:animEffect transition="in" filter="fade">
+                                      <p:cBhvr>
+                                        <p:cTn id="73" dur="500"/>
+                                        <p:tgtEl>
+                                          <p:spTgt spid="27"/>
+                                        </p:tgtEl>
+                                      </p:cBhvr>
+                                    </p:animEffect>
+                                    <p:anim calcmode="lin" valueType="num">
+                                      <p:cBhvr>
+                                        <p:cTn id="74" dur="500" fill="hold"/>
+                                        <p:tgtEl>
+                                          <p:spTgt spid="27"/>
+                                        </p:tgtEl>
+                                        <p:attrNameLst>
+                                          <p:attrName>ppt_x</p:attrName>
+                                        </p:attrNameLst>
+                                      </p:cBhvr>
+                                      <p:tavLst>
+                                        <p:tav tm="0">
+                                          <p:val>
+                                            <p:strVal val="#ppt_x"/>
+                                          </p:val>
+                                        </p:tav>
+                                        <p:tav tm="100000">
+                                          <p:val>
+                                            <p:strVal val="#ppt_x"/>
+                                          </p:val>
+                                        </p:tav>
+                                      </p:tavLst>
+                                    </p:anim>
+                                    <p:anim calcmode="lin" valueType="num">
+                                      <p:cBhvr>
+                                        <p:cTn id="75" dur="500" fill="hold"/>
+                                        <p:tgtEl>
+                                          <p:spTgt spid="27"/>
+                                        </p:tgtEl>
+                                        <p:attrNameLst>
+                                          <p:attrName>ppt_y</p:attrName>
+                                        </p:attrNameLst>
+                                      </p:cBhvr>
+                                      <p:tavLst>
+                                        <p:tav tm="0">
+                                          <p:val>
+                                            <p:strVal val="#ppt_y+.1"/>
+                                          </p:val>
+                                        </p:tav>
+                                        <p:tav tm="100000">
+                                          <p:val>
+                                            <p:strVal val="#ppt_y"/>
+                                          </p:val>
+                                        </p:tav>
+                                      </p:tavLst>
+                                    </p:anim>
+                                  </p:childTnLst>
+                                </p:cTn>
+                              </p:par>
+                              <p:par>
+                                <p:cTn id="76" presetID="42" presetClass="entr" presetSubtype="0" fill="hold" grpId="0" nodeType="withEffect">
+                                  <p:stCondLst>
+                                    <p:cond delay="0"/>
+                                  </p:stCondLst>
+                                  <p:childTnLst>
+                                    <p:set>
+                                      <p:cBhvr>
+                                        <p:cTn id="77" dur="1" fill="hold">
+                                          <p:stCondLst>
+                                            <p:cond delay="0"/>
+                                          </p:stCondLst>
+                                        </p:cTn>
+                                        <p:tgtEl>
+                                          <p:spTgt spid="28"/>
+                                        </p:tgtEl>
+                                        <p:attrNameLst>
+                                          <p:attrName>style.visibility</p:attrName>
+                                        </p:attrNameLst>
+                                      </p:cBhvr>
+                                      <p:to>
+                                        <p:strVal val="visible"/>
+                                      </p:to>
+                                    </p:set>
+                                    <p:animEffect transition="in" filter="fade">
+                                      <p:cBhvr>
+                                        <p:cTn id="78" dur="500"/>
+                                        <p:tgtEl>
+                                          <p:spTgt spid="28"/>
+                                        </p:tgtEl>
+                                      </p:cBhvr>
+                                    </p:animEffect>
+                                    <p:anim calcmode="lin" valueType="num">
+                                      <p:cBhvr>
+                                        <p:cTn id="79" dur="500" fill="hold"/>
+                                        <p:tgtEl>
+                                          <p:spTgt spid="28"/>
+                                        </p:tgtEl>
+                                        <p:attrNameLst>
+                                          <p:attrName>ppt_x</p:attrName>
+                                        </p:attrNameLst>
+                                      </p:cBhvr>
+                                      <p:tavLst>
+                                        <p:tav tm="0">
+                                          <p:val>
+                                            <p:strVal val="#ppt_x"/>
+                                          </p:val>
+                                        </p:tav>
+                                        <p:tav tm="100000">
+                                          <p:val>
+                                            <p:strVal val="#ppt_x"/>
+                                          </p:val>
+                                        </p:tav>
+                                      </p:tavLst>
+                                    </p:anim>
+                                    <p:anim calcmode="lin" valueType="num">
+                                      <p:cBhvr>
+                                        <p:cTn id="80" dur="500" fill="hold"/>
+                                        <p:tgtEl>
+                                          <p:spTgt spid="28"/>
+                                        </p:tgtEl>
+                                        <p:attrNameLst>
+                                          <p:attrName>ppt_y</p:attrName>
+                                        </p:attrNameLst>
+                                      </p:cBhvr>
+                                      <p:tavLst>
+                                        <p:tav tm="0">
+                                          <p:val>
+                                            <p:strVal val="#ppt_y+.1"/>
+                                          </p:val>
+                                        </p:tav>
+                                        <p:tav tm="100000">
+                                          <p:val>
+                                            <p:strVal val="#ppt_y"/>
+                                          </p:val>
+                                        </p:tav>
+                                      </p:tavLst>
+                                    </p:anim>
+                                  </p:childTnLst>
+                                </p:cTn>
+                              </p:par>
+                              <p:par>
+                                <p:cTn id="81" presetID="42" presetClass="entr" presetSubtype="0" fill="hold" grpId="0" nodeType="withEffect">
+                                  <p:stCondLst>
+                                    <p:cond delay="0"/>
+                                  </p:stCondLst>
+                                  <p:childTnLst>
+                                    <p:set>
+                                      <p:cBhvr>
+                                        <p:cTn id="82" dur="1" fill="hold">
+                                          <p:stCondLst>
+                                            <p:cond delay="0"/>
+                                          </p:stCondLst>
+                                        </p:cTn>
+                                        <p:tgtEl>
+                                          <p:spTgt spid="29"/>
+                                        </p:tgtEl>
+                                        <p:attrNameLst>
+                                          <p:attrName>style.visibility</p:attrName>
+                                        </p:attrNameLst>
+                                      </p:cBhvr>
+                                      <p:to>
+                                        <p:strVal val="visible"/>
+                                      </p:to>
+                                    </p:set>
+                                    <p:animEffect transition="in" filter="fade">
+                                      <p:cBhvr>
+                                        <p:cTn id="83" dur="500"/>
+                                        <p:tgtEl>
+                                          <p:spTgt spid="29"/>
+                                        </p:tgtEl>
+                                      </p:cBhvr>
+                                    </p:animEffect>
+                                    <p:anim calcmode="lin" valueType="num">
+                                      <p:cBhvr>
+                                        <p:cTn id="84" dur="500" fill="hold"/>
+                                        <p:tgtEl>
+                                          <p:spTgt spid="29"/>
+                                        </p:tgtEl>
+                                        <p:attrNameLst>
+                                          <p:attrName>ppt_x</p:attrName>
+                                        </p:attrNameLst>
+                                      </p:cBhvr>
+                                      <p:tavLst>
+                                        <p:tav tm="0">
+                                          <p:val>
+                                            <p:strVal val="#ppt_x"/>
+                                          </p:val>
+                                        </p:tav>
+                                        <p:tav tm="100000">
+                                          <p:val>
+                                            <p:strVal val="#ppt_x"/>
+                                          </p:val>
+                                        </p:tav>
+                                      </p:tavLst>
+                                    </p:anim>
+                                    <p:anim calcmode="lin" valueType="num">
+                                      <p:cBhvr>
+                                        <p:cTn id="85" dur="500" fill="hold"/>
+                                        <p:tgtEl>
+                                          <p:spTgt spid="29"/>
+                                        </p:tgtEl>
+                                        <p:attrNameLst>
+                                          <p:attrName>ppt_y</p:attrName>
+                                        </p:attrNameLst>
+                                      </p:cBhvr>
+                                      <p:tavLst>
+                                        <p:tav tm="0">
+                                          <p:val>
+                                            <p:strVal val="#ppt_y+.1"/>
+                                          </p:val>
+                                        </p:tav>
+                                        <p:tav tm="100000">
+                                          <p:val>
+                                            <p:strVal val="#ppt_y"/>
+                                          </p:val>
+                                        </p:tav>
+                                      </p:tavLst>
+                                    </p:anim>
+                                  </p:childTnLst>
+                                </p:cTn>
+                              </p:par>
+                              <p:par>
+                                <p:cTn id="86" presetID="42" presetClass="entr" presetSubtype="0" fill="hold" grpId="0" nodeType="withEffect">
+                                  <p:stCondLst>
+                                    <p:cond delay="0"/>
+                                  </p:stCondLst>
+                                  <p:childTnLst>
+                                    <p:set>
+                                      <p:cBhvr>
+                                        <p:cTn id="87" dur="1" fill="hold">
+                                          <p:stCondLst>
+                                            <p:cond delay="0"/>
+                                          </p:stCondLst>
+                                        </p:cTn>
+                                        <p:tgtEl>
+                                          <p:spTgt spid="30"/>
+                                        </p:tgtEl>
+                                        <p:attrNameLst>
+                                          <p:attrName>style.visibility</p:attrName>
+                                        </p:attrNameLst>
+                                      </p:cBhvr>
+                                      <p:to>
+                                        <p:strVal val="visible"/>
+                                      </p:to>
+                                    </p:set>
+                                    <p:animEffect transition="in" filter="fade">
+                                      <p:cBhvr>
+                                        <p:cTn id="88" dur="500"/>
+                                        <p:tgtEl>
+                                          <p:spTgt spid="30"/>
+                                        </p:tgtEl>
+                                      </p:cBhvr>
+                                    </p:animEffect>
+                                    <p:anim calcmode="lin" valueType="num">
+                                      <p:cBhvr>
+                                        <p:cTn id="89" dur="500" fill="hold"/>
+                                        <p:tgtEl>
+                                          <p:spTgt spid="30"/>
+                                        </p:tgtEl>
+                                        <p:attrNameLst>
+                                          <p:attrName>ppt_x</p:attrName>
+                                        </p:attrNameLst>
+                                      </p:cBhvr>
+                                      <p:tavLst>
+                                        <p:tav tm="0">
+                                          <p:val>
+                                            <p:strVal val="#ppt_x"/>
+                                          </p:val>
+                                        </p:tav>
+                                        <p:tav tm="100000">
+                                          <p:val>
+                                            <p:strVal val="#ppt_x"/>
+                                          </p:val>
+                                        </p:tav>
+                                      </p:tavLst>
+                                    </p:anim>
+                                    <p:anim calcmode="lin" valueType="num">
+                                      <p:cBhvr>
+                                        <p:cTn id="90" dur="500" fill="hold"/>
+                                        <p:tgtEl>
+                                          <p:spTgt spid="30"/>
+                                        </p:tgtEl>
+                                        <p:attrNameLst>
+                                          <p:attrName>ppt_y</p:attrName>
+                                        </p:attrNameLst>
+                                      </p:cBhvr>
+                                      <p:tavLst>
+                                        <p:tav tm="0">
+                                          <p:val>
+                                            <p:strVal val="#ppt_y+.1"/>
+                                          </p:val>
+                                        </p:tav>
+                                        <p:tav tm="100000">
+                                          <p:val>
+                                            <p:strVal val="#ppt_y"/>
+                                          </p:val>
+                                        </p:tav>
+                                      </p:tavLst>
+                                    </p:anim>
+                                  </p:childTnLst>
+                                </p:cTn>
+                              </p:par>
+                              <p:par>
+                                <p:cTn id="91" presetID="42" presetClass="entr" presetSubtype="0" fill="hold" grpId="0" nodeType="withEffect">
+                                  <p:stCondLst>
+                                    <p:cond delay="0"/>
+                                  </p:stCondLst>
+                                  <p:childTnLst>
+                                    <p:set>
+                                      <p:cBhvr>
+                                        <p:cTn id="92" dur="1" fill="hold">
+                                          <p:stCondLst>
+                                            <p:cond delay="0"/>
+                                          </p:stCondLst>
+                                        </p:cTn>
+                                        <p:tgtEl>
+                                          <p:spTgt spid="31"/>
+                                        </p:tgtEl>
+                                        <p:attrNameLst>
+                                          <p:attrName>style.visibility</p:attrName>
+                                        </p:attrNameLst>
+                                      </p:cBhvr>
+                                      <p:to>
+                                        <p:strVal val="visible"/>
+                                      </p:to>
+                                    </p:set>
+                                    <p:animEffect transition="in" filter="fade">
+                                      <p:cBhvr>
+                                        <p:cTn id="93" dur="500"/>
+                                        <p:tgtEl>
+                                          <p:spTgt spid="31"/>
+                                        </p:tgtEl>
+                                      </p:cBhvr>
+                                    </p:animEffect>
+                                    <p:anim calcmode="lin" valueType="num">
+                                      <p:cBhvr>
+                                        <p:cTn id="94" dur="500" fill="hold"/>
+                                        <p:tgtEl>
+                                          <p:spTgt spid="31"/>
+                                        </p:tgtEl>
+                                        <p:attrNameLst>
+                                          <p:attrName>ppt_x</p:attrName>
+                                        </p:attrNameLst>
+                                      </p:cBhvr>
+                                      <p:tavLst>
+                                        <p:tav tm="0">
+                                          <p:val>
+                                            <p:strVal val="#ppt_x"/>
+                                          </p:val>
+                                        </p:tav>
+                                        <p:tav tm="100000">
+                                          <p:val>
+                                            <p:strVal val="#ppt_x"/>
+                                          </p:val>
+                                        </p:tav>
+                                      </p:tavLst>
+                                    </p:anim>
+                                    <p:anim calcmode="lin" valueType="num">
+                                      <p:cBhvr>
+                                        <p:cTn id="95" dur="500" fill="hold"/>
+                                        <p:tgtEl>
+                                          <p:spTgt spid="31"/>
+                                        </p:tgtEl>
+                                        <p:attrNameLst>
+                                          <p:attrName>ppt_y</p:attrName>
+                                        </p:attrNameLst>
+                                      </p:cBhvr>
+                                      <p:tavLst>
+                                        <p:tav tm="0">
+                                          <p:val>
+                                            <p:strVal val="#ppt_y+.1"/>
+                                          </p:val>
+                                        </p:tav>
+                                        <p:tav tm="100000">
+                                          <p:val>
+                                            <p:strVal val="#ppt_y"/>
+                                          </p:val>
+                                        </p:tav>
+                                      </p:tavLst>
+                                    </p:anim>
+                                  </p:childTnLst>
+                                </p:cTn>
+                              </p:par>
+                              <p:par>
+                                <p:cTn id="96" presetID="42" presetClass="entr" presetSubtype="0" fill="hold" grpId="0" nodeType="withEffect">
+                                  <p:stCondLst>
+                                    <p:cond delay="0"/>
+                                  </p:stCondLst>
+                                  <p:childTnLst>
+                                    <p:set>
+                                      <p:cBhvr>
+                                        <p:cTn id="97" dur="1" fill="hold">
+                                          <p:stCondLst>
+                                            <p:cond delay="0"/>
+                                          </p:stCondLst>
+                                        </p:cTn>
+                                        <p:tgtEl>
+                                          <p:spTgt spid="32"/>
+                                        </p:tgtEl>
+                                        <p:attrNameLst>
+                                          <p:attrName>style.visibility</p:attrName>
+                                        </p:attrNameLst>
+                                      </p:cBhvr>
+                                      <p:to>
+                                        <p:strVal val="visible"/>
+                                      </p:to>
+                                    </p:set>
+                                    <p:animEffect transition="in" filter="fade">
+                                      <p:cBhvr>
+                                        <p:cTn id="98" dur="500"/>
+                                        <p:tgtEl>
+                                          <p:spTgt spid="32"/>
+                                        </p:tgtEl>
+                                      </p:cBhvr>
+                                    </p:animEffect>
+                                    <p:anim calcmode="lin" valueType="num">
+                                      <p:cBhvr>
+                                        <p:cTn id="99" dur="500" fill="hold"/>
+                                        <p:tgtEl>
+                                          <p:spTgt spid="32"/>
+                                        </p:tgtEl>
+                                        <p:attrNameLst>
+                                          <p:attrName>ppt_x</p:attrName>
+                                        </p:attrNameLst>
+                                      </p:cBhvr>
+                                      <p:tavLst>
+                                        <p:tav tm="0">
+                                          <p:val>
+                                            <p:strVal val="#ppt_x"/>
+                                          </p:val>
+                                        </p:tav>
+                                        <p:tav tm="100000">
+                                          <p:val>
+                                            <p:strVal val="#ppt_x"/>
+                                          </p:val>
+                                        </p:tav>
+                                      </p:tavLst>
+                                    </p:anim>
+                                    <p:anim calcmode="lin" valueType="num">
+                                      <p:cBhvr>
+                                        <p:cTn id="100" dur="500" fill="hold"/>
+                                        <p:tgtEl>
+                                          <p:spTgt spid="32"/>
+                                        </p:tgtEl>
+                                        <p:attrNameLst>
+                                          <p:attrName>ppt_y</p:attrName>
+                                        </p:attrNameLst>
+                                      </p:cBhvr>
+                                      <p:tavLst>
+                                        <p:tav tm="0">
+                                          <p:val>
+                                            <p:strVal val="#ppt_y+.1"/>
+                                          </p:val>
+                                        </p:tav>
+                                        <p:tav tm="100000">
+                                          <p:val>
+                                            <p:strVal val="#ppt_y"/>
+                                          </p:val>
+                                        </p:tav>
+                                      </p:tavLst>
+                                    </p:anim>
+                                  </p:childTnLst>
+                                </p:cTn>
+                              </p:par>
+                              <p:par>
+                                <p:cTn id="101" presetID="42" presetClass="entr" presetSubtype="0" fill="hold" grpId="0" nodeType="withEffect">
+                                  <p:stCondLst>
+                                    <p:cond delay="0"/>
+                                  </p:stCondLst>
+                                  <p:childTnLst>
+                                    <p:set>
+                                      <p:cBhvr>
+                                        <p:cTn id="102" dur="1" fill="hold">
+                                          <p:stCondLst>
+                                            <p:cond delay="0"/>
+                                          </p:stCondLst>
+                                        </p:cTn>
+                                        <p:tgtEl>
+                                          <p:spTgt spid="33"/>
+                                        </p:tgtEl>
+                                        <p:attrNameLst>
+                                          <p:attrName>style.visibility</p:attrName>
+                                        </p:attrNameLst>
+                                      </p:cBhvr>
+                                      <p:to>
+                                        <p:strVal val="visible"/>
+                                      </p:to>
+                                    </p:set>
+                                    <p:animEffect transition="in" filter="fade">
+                                      <p:cBhvr>
+                                        <p:cTn id="103" dur="500"/>
+                                        <p:tgtEl>
+                                          <p:spTgt spid="33"/>
+                                        </p:tgtEl>
+                                      </p:cBhvr>
+                                    </p:animEffect>
+                                    <p:anim calcmode="lin" valueType="num">
+                                      <p:cBhvr>
+                                        <p:cTn id="104" dur="500" fill="hold"/>
+                                        <p:tgtEl>
+                                          <p:spTgt spid="33"/>
+                                        </p:tgtEl>
+                                        <p:attrNameLst>
+                                          <p:attrName>ppt_x</p:attrName>
+                                        </p:attrNameLst>
+                                      </p:cBhvr>
+                                      <p:tavLst>
+                                        <p:tav tm="0">
+                                          <p:val>
+                                            <p:strVal val="#ppt_x"/>
+                                          </p:val>
+                                        </p:tav>
+                                        <p:tav tm="100000">
+                                          <p:val>
+                                            <p:strVal val="#ppt_x"/>
+                                          </p:val>
+                                        </p:tav>
+                                      </p:tavLst>
+                                    </p:anim>
+                                    <p:anim calcmode="lin" valueType="num">
+                                      <p:cBhvr>
+                                        <p:cTn id="105" dur="500" fill="hold"/>
+                                        <p:tgtEl>
+                                          <p:spTgt spid="33"/>
+                                        </p:tgtEl>
+                                        <p:attrNameLst>
+                                          <p:attrName>ppt_y</p:attrName>
+                                        </p:attrNameLst>
+                                      </p:cBhvr>
+                                      <p:tavLst>
+                                        <p:tav tm="0">
+                                          <p:val>
+                                            <p:strVal val="#ppt_y+.1"/>
+                                          </p:val>
+                                        </p:tav>
+                                        <p:tav tm="100000">
+                                          <p:val>
+                                            <p:strVal val="#ppt_y"/>
+                                          </p:val>
+                                        </p:tav>
+                                      </p:tavLst>
+                                    </p:anim>
+                                  </p:childTnLst>
+                                </p:cTn>
+                              </p:par>
+                              <p:par>
+                                <p:cTn id="106" presetID="42" presetClass="entr" presetSubtype="0" fill="hold" grpId="0" nodeType="withEffect">
+                                  <p:stCondLst>
+                                    <p:cond delay="0"/>
+                                  </p:stCondLst>
+                                  <p:childTnLst>
+                                    <p:set>
+                                      <p:cBhvr>
+                                        <p:cTn id="107" dur="1" fill="hold">
+                                          <p:stCondLst>
+                                            <p:cond delay="0"/>
+                                          </p:stCondLst>
+                                        </p:cTn>
+                                        <p:tgtEl>
+                                          <p:spTgt spid="35"/>
+                                        </p:tgtEl>
+                                        <p:attrNameLst>
+                                          <p:attrName>style.visibility</p:attrName>
+                                        </p:attrNameLst>
+                                      </p:cBhvr>
+                                      <p:to>
+                                        <p:strVal val="visible"/>
+                                      </p:to>
+                                    </p:set>
+                                    <p:animEffect transition="in" filter="fade">
+                                      <p:cBhvr>
+                                        <p:cTn id="108" dur="500"/>
+                                        <p:tgtEl>
+                                          <p:spTgt spid="35"/>
+                                        </p:tgtEl>
+                                      </p:cBhvr>
+                                    </p:animEffect>
+                                    <p:anim calcmode="lin" valueType="num">
+                                      <p:cBhvr>
+                                        <p:cTn id="109" dur="500" fill="hold"/>
+                                        <p:tgtEl>
+                                          <p:spTgt spid="35"/>
+                                        </p:tgtEl>
+                                        <p:attrNameLst>
+                                          <p:attrName>ppt_x</p:attrName>
+                                        </p:attrNameLst>
+                                      </p:cBhvr>
+                                      <p:tavLst>
+                                        <p:tav tm="0">
+                                          <p:val>
+                                            <p:strVal val="#ppt_x"/>
+                                          </p:val>
+                                        </p:tav>
+                                        <p:tav tm="100000">
+                                          <p:val>
+                                            <p:strVal val="#ppt_x"/>
+                                          </p:val>
+                                        </p:tav>
+                                      </p:tavLst>
+                                    </p:anim>
+                                    <p:anim calcmode="lin" valueType="num">
+                                      <p:cBhvr>
+                                        <p:cTn id="110" dur="500" fill="hold"/>
+                                        <p:tgtEl>
+                                          <p:spTgt spid="35"/>
+                                        </p:tgtEl>
+                                        <p:attrNameLst>
+                                          <p:attrName>ppt_y</p:attrName>
+                                        </p:attrNameLst>
+                                      </p:cBhvr>
+                                      <p:tavLst>
+                                        <p:tav tm="0">
+                                          <p:val>
+                                            <p:strVal val="#ppt_y+.1"/>
+                                          </p:val>
+                                        </p:tav>
+                                        <p:tav tm="100000">
+                                          <p:val>
+                                            <p:strVal val="#ppt_y"/>
+                                          </p:val>
+                                        </p:tav>
+                                      </p:tavLst>
+                                    </p:anim>
+                                  </p:childTnLst>
+                                </p:cTn>
+                              </p:par>
+                              <p:par>
+                                <p:cTn id="111" presetID="42" presetClass="entr" presetSubtype="0" fill="hold" grpId="0" nodeType="withEffect">
+                                  <p:stCondLst>
+                                    <p:cond delay="0"/>
+                                  </p:stCondLst>
+                                  <p:childTnLst>
+                                    <p:set>
+                                      <p:cBhvr>
+                                        <p:cTn id="112" dur="1" fill="hold">
+                                          <p:stCondLst>
+                                            <p:cond delay="0"/>
+                                          </p:stCondLst>
+                                        </p:cTn>
+                                        <p:tgtEl>
+                                          <p:spTgt spid="34"/>
+                                        </p:tgtEl>
+                                        <p:attrNameLst>
+                                          <p:attrName>style.visibility</p:attrName>
+                                        </p:attrNameLst>
+                                      </p:cBhvr>
+                                      <p:to>
+                                        <p:strVal val="visible"/>
+                                      </p:to>
+                                    </p:set>
+                                    <p:animEffect transition="in" filter="fade">
+                                      <p:cBhvr>
+                                        <p:cTn id="113" dur="500"/>
+                                        <p:tgtEl>
+                                          <p:spTgt spid="34"/>
+                                        </p:tgtEl>
+                                      </p:cBhvr>
+                                    </p:animEffect>
+                                    <p:anim calcmode="lin" valueType="num">
+                                      <p:cBhvr>
+                                        <p:cTn id="114" dur="500" fill="hold"/>
+                                        <p:tgtEl>
+                                          <p:spTgt spid="34"/>
+                                        </p:tgtEl>
+                                        <p:attrNameLst>
+                                          <p:attrName>ppt_x</p:attrName>
+                                        </p:attrNameLst>
+                                      </p:cBhvr>
+                                      <p:tavLst>
+                                        <p:tav tm="0">
+                                          <p:val>
+                                            <p:strVal val="#ppt_x"/>
+                                          </p:val>
+                                        </p:tav>
+                                        <p:tav tm="100000">
+                                          <p:val>
+                                            <p:strVal val="#ppt_x"/>
+                                          </p:val>
+                                        </p:tav>
+                                      </p:tavLst>
+                                    </p:anim>
+                                    <p:anim calcmode="lin" valueType="num">
+                                      <p:cBhvr>
+                                        <p:cTn id="115" dur="500" fill="hold"/>
+                                        <p:tgtEl>
+                                          <p:spTgt spid="34"/>
+                                        </p:tgtEl>
+                                        <p:attrNameLst>
+                                          <p:attrName>ppt_y</p:attrName>
+                                        </p:attrNameLst>
+                                      </p:cBhvr>
+                                      <p:tavLst>
+                                        <p:tav tm="0">
+                                          <p:val>
+                                            <p:strVal val="#ppt_y+.1"/>
+                                          </p:val>
+                                        </p:tav>
+                                        <p:tav tm="100000">
+                                          <p:val>
+                                            <p:strVal val="#ppt_y"/>
+                                          </p:val>
+                                        </p:tav>
+                                      </p:tavLst>
+                                    </p:anim>
+                                  </p:childTnLst>
+                                </p:cTn>
+                              </p:par>
+                            </p:childTnLst>
+                          </p:cTn>
+                        </p:par>
+                        <p:par>
+                          <p:cTn id="116" fill="hold">
+                            <p:stCondLst>
+                              <p:cond delay="500"/>
+                            </p:stCondLst>
+                            <p:childTnLst>
+                              <p:par>
+                                <p:cTn id="117" presetID="42" presetClass="entr" presetSubtype="0" fill="hold" grpId="0" nodeType="afterEffect">
+                                  <p:stCondLst>
+                                    <p:cond delay="0"/>
+                                  </p:stCondLst>
+                                  <p:childTnLst>
+                                    <p:set>
+                                      <p:cBhvr>
+                                        <p:cTn id="118" dur="1" fill="hold">
+                                          <p:stCondLst>
+                                            <p:cond delay="0"/>
+                                          </p:stCondLst>
+                                        </p:cTn>
+                                        <p:tgtEl>
+                                          <p:spTgt spid="8"/>
+                                        </p:tgtEl>
+                                        <p:attrNameLst>
+                                          <p:attrName>style.visibility</p:attrName>
+                                        </p:attrNameLst>
+                                      </p:cBhvr>
+                                      <p:to>
+                                        <p:strVal val="visible"/>
+                                      </p:to>
+                                    </p:set>
+                                    <p:animEffect transition="in" filter="fade">
+                                      <p:cBhvr>
+                                        <p:cTn id="119" dur="1000"/>
+                                        <p:tgtEl>
+                                          <p:spTgt spid="8"/>
+                                        </p:tgtEl>
+                                      </p:cBhvr>
+                                    </p:animEffect>
+                                    <p:anim calcmode="lin" valueType="num">
+                                      <p:cBhvr>
+                                        <p:cTn id="120" dur="1000" fill="hold"/>
+                                        <p:tgtEl>
+                                          <p:spTgt spid="8"/>
+                                        </p:tgtEl>
+                                        <p:attrNameLst>
+                                          <p:attrName>ppt_x</p:attrName>
+                                        </p:attrNameLst>
+                                      </p:cBhvr>
+                                      <p:tavLst>
+                                        <p:tav tm="0">
+                                          <p:val>
+                                            <p:strVal val="#ppt_x"/>
+                                          </p:val>
+                                        </p:tav>
+                                        <p:tav tm="100000">
+                                          <p:val>
+                                            <p:strVal val="#ppt_x"/>
+                                          </p:val>
+                                        </p:tav>
+                                      </p:tavLst>
+                                    </p:anim>
+                                    <p:anim calcmode="lin" valueType="num">
+                                      <p:cBhvr>
+                                        <p:cTn id="121" dur="1000" fill="hold"/>
+                                        <p:tgtEl>
+                                          <p:spTgt spid="8"/>
+                                        </p:tgtEl>
+                                        <p:attrNameLst>
+                                          <p:attrName>ppt_y</p:attrName>
+                                        </p:attrNameLst>
+                                      </p:cBhvr>
+                                      <p:tavLst>
+                                        <p:tav tm="0">
+                                          <p:val>
+                                            <p:strVal val="#ppt_y+.1"/>
+                                          </p:val>
+                                        </p:tav>
+                                        <p:tav tm="100000">
+                                          <p:val>
+                                            <p:strVal val="#ppt_y"/>
+                                          </p:val>
+                                        </p:tav>
+                                      </p:tavLst>
+                                    </p:anim>
+                                  </p:childTnLst>
+                                </p:cTn>
+                              </p:par>
+                            </p:childTnLst>
+                          </p:cTn>
+                        </p:par>
+                      </p:childTnLst>
+                    </p:cTn>
+                  </p:par>
+                </p:childTnLst>
+              </p:cTn>
+              <p:prevCondLst>
+                <p:cond evt="onPrev" delay="0">
+                  <p:tgtEl>
+                    <p:sldTgt/>
+                  </p:tgtEl>
+                </p:cond>
+              </p:prevCondLst>
+              <p:nextCondLst>
+                <p:cond evt="onNext" delay="0">
+                  <p:tgtEl>
+                    <p:sldTgt/>
+                  </p:tgtEl>
+                </p:cond>
+              </p:nextCondLst>
+            </p:seq>
+          </p:childTnLst>
+        </p:cTn>
+      </p:par>
+    </p:tnLst>
+    <p:bldLst>
+      <p:bldP spid="3" grpId="0" uiExpand="1" build="p"/>
+      <p:bldP spid="7" grpId="0" animBg="1"/>
+      <p:bldP spid="8" grpId="0" animBg="1"/>
+      <p:bldP spid="17" grpId="0"/>
+      <p:bldP spid="19" grpId="0"/>
+      <p:bldP spid="20" grpId="0" animBg="1"/>
+      <p:bldP spid="21" grpId="0" animBg="1"/>
+      <p:bldP spid="22" grpId="0" animBg="1"/>
+      <p:bldP spid="23" grpId="0" animBg="1"/>
+      <p:bldP spid="24" grpId="0" animBg="1"/>
+      <p:bldP spid="25" grpId="0" animBg="1"/>
+      <p:bldP spid="26" grpId="0" animBg="1"/>
+      <p:bldP spid="27" grpId="0" animBg="1"/>
+      <p:bldP spid="28" grpId="0" animBg="1"/>
+      <p:bldP spid="29" grpId="0" animBg="1"/>
+      <p:bldP spid="30" grpId="0" animBg="1"/>
+      <p:bldP spid="31" grpId="0" animBg="1"/>
+      <p:bldP spid="32" grpId="0" animBg="1"/>
+      <p:bldP spid="33" grpId="0" animBg="1"/>
+      <p:bldP spid="34" grpId="0" animBg="1"/>
+      <p:bldP spid="35" grpId="0" animBg="1"/>
+    </p:bldLst>
+  </p:timing>
 </p:sld>
 </file>
 
-<file path=ppt/slides/slide2.xml><?xml version="1.0" encoding="utf-8"?>
+<file path=ppt/slides/slide3.xml><?xml version="1.0" encoding="utf-8"?>
 <p:sld xmlns:a="http://schemas.openxmlformats.org/drawingml/2006/main" xmlns:r="http://schemas.openxmlformats.org/officeDocument/2006/relationships" xmlns:p="http://schemas.openxmlformats.org/presentationml/2006/main">
   <p:cSld>
     <p:bg>
@@ -6124,7 +9542,7 @@
                 <a16:creationId xmlns:a16="http://schemas.microsoft.com/office/drawing/2014/main" id="{90A61547-2555-4DE2-A37F-A53E54917441}"/>
               </a:ext>
               <a:ext uri="{C183D7F6-B498-43B3-948B-1728B52AA6E4}">
-                <adec:decorative xmlns:adec="http://schemas.microsoft.com/office/drawing/2017/decorative" val="1"/>
+                <adec:decorative xmlns:adec="http://schemas.microsoft.com/office/drawing/2017/decorative" xmlns="" val="1"/>
               </a:ext>
             </a:extLst>
           </p:cNvPr>
@@ -6155,7 +9573,7 @@
                   <a16:creationId xmlns:a16="http://schemas.microsoft.com/office/drawing/2014/main" id="{5C2447E0-8F0D-479C-94E4-82BC8EB68C0C}"/>
                 </a:ext>
                 <a:ext uri="{C183D7F6-B498-43B3-948B-1728B52AA6E4}">
-                  <adec:decorative xmlns:adec="http://schemas.microsoft.com/office/drawing/2017/decorative" val="1"/>
+                  <adec:decorative xmlns:adec="http://schemas.microsoft.com/office/drawing/2017/decorative" xmlns="" val="1"/>
                 </a:ext>
               </a:extLst>
             </p:cNvPr>
@@ -6207,7 +9625,7 @@
                   <a16:creationId xmlns:a16="http://schemas.microsoft.com/office/drawing/2014/main" id="{1F943397-DCDD-44CB-BBA9-9510B7698DD2}"/>
                 </a:ext>
                 <a:ext uri="{C183D7F6-B498-43B3-948B-1728B52AA6E4}">
-                  <adec:decorative xmlns:adec="http://schemas.microsoft.com/office/drawing/2017/decorative" val="1"/>
+                  <adec:decorative xmlns:adec="http://schemas.microsoft.com/office/drawing/2017/decorative" xmlns="" val="1"/>
                 </a:ext>
               </a:extLst>
             </p:cNvPr>
@@ -6259,7 +9677,7 @@
                   <a16:creationId xmlns:a16="http://schemas.microsoft.com/office/drawing/2014/main" id="{E2630ADC-31DB-4C48-AC4A-DAAE5A7B8EA6}"/>
                 </a:ext>
                 <a:ext uri="{C183D7F6-B498-43B3-948B-1728B52AA6E4}">
-                  <adec:decorative xmlns:adec="http://schemas.microsoft.com/office/drawing/2017/decorative" val="1"/>
+                  <adec:decorative xmlns:adec="http://schemas.microsoft.com/office/drawing/2017/decorative" xmlns="" val="1"/>
                 </a:ext>
               </a:extLst>
             </p:cNvPr>
@@ -6337,7 +9755,7 @@
                   <a16:creationId xmlns:a16="http://schemas.microsoft.com/office/drawing/2014/main" id="{2CA5C44E-F54E-47E0-8989-4D8686B33C80}"/>
                 </a:ext>
                 <a:ext uri="{C183D7F6-B498-43B3-948B-1728B52AA6E4}">
-                  <adec:decorative xmlns:adec="http://schemas.microsoft.com/office/drawing/2017/decorative" val="1"/>
+                  <adec:decorative xmlns:adec="http://schemas.microsoft.com/office/drawing/2017/decorative" xmlns="" val="1"/>
                 </a:ext>
               </a:extLst>
             </p:cNvPr>
@@ -6415,7 +9833,7 @@
                   <a16:creationId xmlns:a16="http://schemas.microsoft.com/office/drawing/2014/main" id="{FF54E15E-830B-4375-A239-4C51954DEAEC}"/>
                 </a:ext>
                 <a:ext uri="{C183D7F6-B498-43B3-948B-1728B52AA6E4}">
-                  <adec:decorative xmlns:adec="http://schemas.microsoft.com/office/drawing/2017/decorative" val="1"/>
+                  <adec:decorative xmlns:adec="http://schemas.microsoft.com/office/drawing/2017/decorative" xmlns="" val="1"/>
                 </a:ext>
               </a:extLst>
             </p:cNvPr>
@@ -6471,7 +9889,7 @@
                   <a16:creationId xmlns:a16="http://schemas.microsoft.com/office/drawing/2014/main" id="{CB37E322-FF7E-4872-BD6B-50A48CBEA5CE}"/>
                 </a:ext>
                 <a:ext uri="{C183D7F6-B498-43B3-948B-1728B52AA6E4}">
-                  <adec:decorative xmlns:adec="http://schemas.microsoft.com/office/drawing/2017/decorative" val="1"/>
+                  <adec:decorative xmlns:adec="http://schemas.microsoft.com/office/drawing/2017/decorative" xmlns="" val="1"/>
                 </a:ext>
               </a:extLst>
             </p:cNvPr>
@@ -6550,7 +9968,7 @@
                   <a16:creationId xmlns:a16="http://schemas.microsoft.com/office/drawing/2014/main" id="{710D0C1E-D2F8-45B2-AE14-1AC8E976F7A2}"/>
                 </a:ext>
                 <a:ext uri="{C183D7F6-B498-43B3-948B-1728B52AA6E4}">
-                  <adec:decorative xmlns:adec="http://schemas.microsoft.com/office/drawing/2017/decorative" val="1"/>
+                  <adec:decorative xmlns:adec="http://schemas.microsoft.com/office/drawing/2017/decorative" xmlns="" val="1"/>
                 </a:ext>
               </a:extLst>
             </p:cNvPr>
@@ -6630,7 +10048,7 @@
                   <a16:creationId xmlns:a16="http://schemas.microsoft.com/office/drawing/2014/main" id="{3216331B-17D0-4167-ABD2-B2198058C2D2}"/>
                 </a:ext>
                 <a:ext uri="{C183D7F6-B498-43B3-948B-1728B52AA6E4}">
-                  <adec:decorative xmlns:adec="http://schemas.microsoft.com/office/drawing/2017/decorative" val="1"/>
+                  <adec:decorative xmlns:adec="http://schemas.microsoft.com/office/drawing/2017/decorative" xmlns="" val="1"/>
                 </a:ext>
               </a:extLst>
             </p:cNvPr>
@@ -6708,7 +10126,7 @@
                   <a16:creationId xmlns:a16="http://schemas.microsoft.com/office/drawing/2014/main" id="{A53A7A96-3806-4BB3-91DE-6EED48AC787E}"/>
                 </a:ext>
                 <a:ext uri="{C183D7F6-B498-43B3-948B-1728B52AA6E4}">
-                  <adec:decorative xmlns:adec="http://schemas.microsoft.com/office/drawing/2017/decorative" val="1"/>
+                  <adec:decorative xmlns:adec="http://schemas.microsoft.com/office/drawing/2017/decorative" xmlns="" val="1"/>
                 </a:ext>
               </a:extLst>
             </p:cNvPr>
@@ -6764,7 +10182,7 @@
                   <a16:creationId xmlns:a16="http://schemas.microsoft.com/office/drawing/2014/main" id="{F8C2B86C-EE71-466E-8991-503F9C9C1B22}"/>
                 </a:ext>
                 <a:ext uri="{C183D7F6-B498-43B3-948B-1728B52AA6E4}">
-                  <adec:decorative xmlns:adec="http://schemas.microsoft.com/office/drawing/2017/decorative" val="1"/>
+                  <adec:decorative xmlns:adec="http://schemas.microsoft.com/office/drawing/2017/decorative" xmlns="" val="1"/>
                 </a:ext>
               </a:extLst>
             </p:cNvPr>
@@ -6892,10 +10310,17 @@
   <p:clrMapOvr>
     <a:masterClrMapping/>
   </p:clrMapOvr>
+  <p:timing>
+    <p:tnLst>
+      <p:par>
+        <p:cTn id="1" dur="indefinite" restart="never" nodeType="tmRoot"/>
+      </p:par>
+    </p:tnLst>
+  </p:timing>
 </p:sld>
 </file>
 
-<file path=ppt/slides/slide3.xml><?xml version="1.0" encoding="utf-8"?>
+<file path=ppt/slides/slide4.xml><?xml version="1.0" encoding="utf-8"?>
 <p:sld xmlns:a="http://schemas.openxmlformats.org/drawingml/2006/main" xmlns:r="http://schemas.openxmlformats.org/officeDocument/2006/relationships" xmlns:p="http://schemas.openxmlformats.org/presentationml/2006/main">
   <p:cSld>
     <p:spTree>
@@ -6975,6 +10400,13 @@
   <p:clrMapOvr>
     <a:masterClrMapping/>
   </p:clrMapOvr>
+  <p:timing>
+    <p:tnLst>
+      <p:par>
+        <p:cTn id="1" dur="indefinite" restart="never" nodeType="tmRoot"/>
+      </p:par>
+    </p:tnLst>
+  </p:timing>
 </p:sld>
 </file>
 

</xml_diff>